<commit_message>
added more visualization, deleted some slides
</commit_message>
<xml_diff>
--- a/GROUP 9 PHASE 4 PROJECT.pptx
+++ b/GROUP 9 PHASE 4 PROJECT.pptx
@@ -12,19 +12,20 @@
     <p:sldId id="260" r:id="rId6"/>
     <p:sldId id="261" r:id="rId7"/>
     <p:sldId id="262" r:id="rId8"/>
-    <p:sldId id="273" r:id="rId9"/>
-    <p:sldId id="274" r:id="rId10"/>
-    <p:sldId id="263" r:id="rId11"/>
-    <p:sldId id="264" r:id="rId12"/>
-    <p:sldId id="265" r:id="rId13"/>
-    <p:sldId id="266" r:id="rId14"/>
-    <p:sldId id="267" r:id="rId15"/>
-    <p:sldId id="270" r:id="rId16"/>
-    <p:sldId id="268" r:id="rId17"/>
-    <p:sldId id="269" r:id="rId18"/>
-    <p:sldId id="271" r:id="rId19"/>
-    <p:sldId id="272" r:id="rId20"/>
-    <p:sldId id="276" r:id="rId21"/>
+    <p:sldId id="277" r:id="rId9"/>
+    <p:sldId id="278" r:id="rId10"/>
+    <p:sldId id="273" r:id="rId11"/>
+    <p:sldId id="263" r:id="rId12"/>
+    <p:sldId id="264" r:id="rId13"/>
+    <p:sldId id="265" r:id="rId14"/>
+    <p:sldId id="266" r:id="rId15"/>
+    <p:sldId id="267" r:id="rId16"/>
+    <p:sldId id="270" r:id="rId17"/>
+    <p:sldId id="268" r:id="rId18"/>
+    <p:sldId id="269" r:id="rId19"/>
+    <p:sldId id="271" r:id="rId20"/>
+    <p:sldId id="272" r:id="rId21"/>
+    <p:sldId id="276" r:id="rId22"/>
   </p:sldIdLst>
   <p:sldSz cx="12192000" cy="6858000"/>
   <p:notesSz cx="6858000" cy="9144000"/>
@@ -6797,6 +6798,506 @@
           <a:chExt cx="0" cy="0"/>
         </a:xfrm>
       </p:grpSpPr>
+      <p:sp useBgFill="1">
+        <p:nvSpPr>
+          <p:cNvPr id="13" name="Rectangle 12">
+            <a:extLst>
+              <a:ext uri="{FF2B5EF4-FFF2-40B4-BE49-F238E27FC236}">
+                <a16:creationId xmlns:a16="http://schemas.microsoft.com/office/drawing/2014/main" id="{E49D7415-2F11-44C2-B6AA-13A25B6814B9}"/>
+              </a:ext>
+              <a:ext uri="{C183D7F6-B498-43B3-948B-1728B52AA6E4}">
+                <adec:decorative xmlns:adec="http://schemas.microsoft.com/office/drawing/2017/decorative" xmlns="" val="1"/>
+              </a:ext>
+            </a:extLst>
+          </p:cNvPr>
+          <p:cNvSpPr>
+            <a:spLocks noGrp="1" noRot="1" noChangeAspect="1" noMove="1" noResize="1" noEditPoints="1" noAdjustHandles="1" noChangeArrowheads="1" noChangeShapeType="1" noTextEdit="1"/>
+          </p:cNvSpPr>
+          <p:nvPr>
+            <p:extLst>
+              <p:ext uri="{386F3935-93C4-4BCD-93E2-E3B085C9AB24}">
+                <p16:designElem xmlns:p16="http://schemas.microsoft.com/office/powerpoint/2015/main" val="1"/>
+              </p:ext>
+            </p:extLst>
+          </p:nvPr>
+        </p:nvSpPr>
+        <p:spPr>
+          <a:xfrm>
+            <a:off x="0" y="0"/>
+            <a:ext cx="12192000" cy="6858000"/>
+          </a:xfrm>
+          <a:prstGeom prst="rect">
+            <a:avLst/>
+          </a:prstGeom>
+          <a:ln w="12700" cap="flat" cmpd="sng" algn="ctr">
+            <a:noFill/>
+            <a:prstDash val="solid"/>
+            <a:miter lim="800000"/>
+          </a:ln>
+          <a:effectLst/>
+          <a:extLst>
+            <a:ext uri="{91240B29-F687-4F45-9708-019B960494DF}">
+              <a14:hiddenLine xmlns:a14="http://schemas.microsoft.com/office/drawing/2010/main" w="12700" cap="flat" cmpd="sng" algn="ctr">
+                <a:solidFill>
+                  <a:schemeClr val="accent1">
+                    <a:shade val="50000"/>
+                  </a:schemeClr>
+                </a:solidFill>
+                <a:prstDash val="solid"/>
+                <a:miter lim="800000"/>
+              </a14:hiddenLine>
+            </a:ext>
+          </a:extLst>
+        </p:spPr>
+        <p:style>
+          <a:lnRef idx="2">
+            <a:schemeClr val="accent1">
+              <a:shade val="50000"/>
+            </a:schemeClr>
+          </a:lnRef>
+          <a:fillRef idx="1">
+            <a:schemeClr val="accent1"/>
+          </a:fillRef>
+          <a:effectRef idx="0">
+            <a:schemeClr val="accent1"/>
+          </a:effectRef>
+          <a:fontRef idx="minor">
+            <a:schemeClr val="lt1"/>
+          </a:fontRef>
+        </p:style>
+        <p:txBody>
+          <a:bodyPr rtlCol="0" anchor="ctr"/>
+          <a:lstStyle/>
+          <a:p>
+            <a:pPr algn="ctr"/>
+            <a:endParaRPr lang="en-US"/>
+          </a:p>
+        </p:txBody>
+      </p:sp>
+      <p:sp>
+        <p:nvSpPr>
+          <p:cNvPr id="2" name="Title 1">
+            <a:extLst>
+              <a:ext uri="{FF2B5EF4-FFF2-40B4-BE49-F238E27FC236}">
+                <a16:creationId xmlns:a16="http://schemas.microsoft.com/office/drawing/2014/main" id="{AAB87A54-5366-E4D4-CAFF-4C7FE83BE59E}"/>
+              </a:ext>
+            </a:extLst>
+          </p:cNvPr>
+          <p:cNvSpPr>
+            <a:spLocks noGrp="1"/>
+          </p:cNvSpPr>
+          <p:nvPr>
+            <p:ph type="title"/>
+          </p:nvPr>
+        </p:nvSpPr>
+        <p:spPr>
+          <a:xfrm>
+            <a:off x="704088" y="914400"/>
+            <a:ext cx="5195889" cy="1316736"/>
+          </a:xfrm>
+        </p:spPr>
+        <p:txBody>
+          <a:bodyPr>
+            <a:normAutofit/>
+          </a:bodyPr>
+          <a:lstStyle/>
+          <a:p>
+            <a:r>
+              <a:rPr lang="en-US"/>
+              <a:t>Model Evaluation</a:t>
+            </a:r>
+          </a:p>
+        </p:txBody>
+      </p:sp>
+      <p:cxnSp>
+        <p:nvCxnSpPr>
+          <p:cNvPr id="14" name="Straight Connector 13">
+            <a:extLst>
+              <a:ext uri="{FF2B5EF4-FFF2-40B4-BE49-F238E27FC236}">
+                <a16:creationId xmlns:a16="http://schemas.microsoft.com/office/drawing/2014/main" id="{F2B951FD-94F7-E138-3EC2-A66A551D9137}"/>
+              </a:ext>
+              <a:ext uri="{C183D7F6-B498-43B3-948B-1728B52AA6E4}">
+                <adec:decorative xmlns:adec="http://schemas.microsoft.com/office/drawing/2017/decorative" xmlns="" val="1"/>
+              </a:ext>
+            </a:extLst>
+          </p:cNvPr>
+          <p:cNvCxnSpPr>
+            <a:cxnSpLocks noGrp="1" noRot="1" noChangeAspect="1" noMove="1" noResize="1" noEditPoints="1" noAdjustHandles="1" noChangeArrowheads="1" noChangeShapeType="1"/>
+          </p:cNvCxnSpPr>
+          <p:nvPr>
+            <p:extLst>
+              <p:ext uri="{386F3935-93C4-4BCD-93E2-E3B085C9AB24}">
+                <p16:designElem xmlns:p16="http://schemas.microsoft.com/office/powerpoint/2015/main" val="1"/>
+              </p:ext>
+            </p:extLst>
+          </p:nvPr>
+        </p:nvCxnSpPr>
+        <p:spPr>
+          <a:xfrm>
+            <a:off x="804672" y="722376"/>
+            <a:ext cx="1638300" cy="0"/>
+          </a:xfrm>
+          <a:prstGeom prst="line">
+            <a:avLst/>
+          </a:prstGeom>
+          <a:ln w="44450">
+            <a:solidFill>
+              <a:schemeClr val="tx1"/>
+            </a:solidFill>
+          </a:ln>
+        </p:spPr>
+        <p:style>
+          <a:lnRef idx="1">
+            <a:schemeClr val="accent1"/>
+          </a:lnRef>
+          <a:fillRef idx="0">
+            <a:schemeClr val="accent1"/>
+          </a:fillRef>
+          <a:effectRef idx="0">
+            <a:schemeClr val="accent1"/>
+          </a:effectRef>
+          <a:fontRef idx="minor">
+            <a:schemeClr val="tx1"/>
+          </a:fontRef>
+        </p:style>
+      </p:cxnSp>
+      <p:sp>
+        <p:nvSpPr>
+          <p:cNvPr id="3" name="Content Placeholder 2">
+            <a:extLst>
+              <a:ext uri="{FF2B5EF4-FFF2-40B4-BE49-F238E27FC236}">
+                <a16:creationId xmlns:a16="http://schemas.microsoft.com/office/drawing/2014/main" id="{B5A594D9-A825-78AA-E548-A860A7C60FF0}"/>
+              </a:ext>
+            </a:extLst>
+          </p:cNvPr>
+          <p:cNvSpPr>
+            <a:spLocks noGrp="1"/>
+          </p:cNvSpPr>
+          <p:nvPr>
+            <p:ph idx="1"/>
+          </p:nvPr>
+        </p:nvSpPr>
+        <p:spPr>
+          <a:xfrm>
+            <a:off x="704088" y="2231136"/>
+            <a:ext cx="5195889" cy="3931920"/>
+          </a:xfrm>
+        </p:spPr>
+        <p:txBody>
+          <a:bodyPr vert="horz" lIns="91440" tIns="45720" rIns="91440" bIns="45720" rtlCol="0" anchor="t">
+            <a:normAutofit/>
+          </a:bodyPr>
+          <a:lstStyle/>
+          <a:p>
+            <a:pPr marL="0" indent="0">
+              <a:lnSpc>
+                <a:spcPct val="100000"/>
+              </a:lnSpc>
+              <a:buNone/>
+            </a:pPr>
+            <a:r>
+              <a:rPr lang="en-US" sz="1600" dirty="0">
+                <a:latin typeface="Cambria"/>
+                <a:cs typeface="Helvetica"/>
+              </a:rPr>
+              <a:t/>
+            </a:r>
+            <a:br>
+              <a:rPr lang="en-US" sz="1600" dirty="0">
+                <a:latin typeface="Cambria"/>
+                <a:cs typeface="Helvetica"/>
+              </a:rPr>
+            </a:br>
+            <a:r>
+              <a:rPr lang="en-US" sz="1600" dirty="0" smtClean="0">
+                <a:latin typeface="Cambria"/>
+                <a:cs typeface="Helvetica"/>
+              </a:rPr>
+              <a:t>We used the following models to </a:t>
+            </a:r>
+            <a:r>
+              <a:rPr lang="en-US" sz="1600" dirty="0" err="1" smtClean="0">
+                <a:latin typeface="Cambria"/>
+                <a:cs typeface="Helvetica"/>
+              </a:rPr>
+              <a:t>analyse</a:t>
+            </a:r>
+            <a:r>
+              <a:rPr lang="en-US" sz="1600" dirty="0" smtClean="0">
+                <a:latin typeface="Cambria"/>
+                <a:cs typeface="Helvetica"/>
+              </a:rPr>
+              <a:t> the data and have ranked them b</a:t>
+            </a:r>
+            <a:r>
+              <a:rPr lang="en-US" sz="1600" dirty="0" smtClean="0">
+                <a:latin typeface="Cambria"/>
+                <a:ea typeface="Cambria"/>
+                <a:cs typeface="Helvetica"/>
+              </a:rPr>
+              <a:t>ased </a:t>
+            </a:r>
+            <a:r>
+              <a:rPr lang="en-US" sz="1600" dirty="0">
+                <a:latin typeface="Cambria"/>
+                <a:ea typeface="Cambria"/>
+                <a:cs typeface="Helvetica"/>
+              </a:rPr>
+              <a:t>on accuracy of each model, below is the ranking of each model:</a:t>
+            </a:r>
+            <a:r>
+              <a:rPr lang="en-US" sz="1600" dirty="0">
+                <a:latin typeface="Cambria"/>
+                <a:cs typeface="Helvetica"/>
+              </a:rPr>
+              <a:t/>
+            </a:r>
+            <a:br>
+              <a:rPr lang="en-US" sz="1600" dirty="0">
+                <a:latin typeface="Cambria"/>
+                <a:cs typeface="Helvetica"/>
+              </a:rPr>
+            </a:br>
+            <a:r>
+              <a:rPr lang="en-US" sz="1600" dirty="0">
+                <a:latin typeface="Cambria"/>
+                <a:ea typeface="Cambria"/>
+                <a:cs typeface="Helvetica"/>
+              </a:rPr>
+              <a:t> </a:t>
+            </a:r>
+            <a:r>
+              <a:rPr lang="en-US" sz="1600" dirty="0">
+                <a:latin typeface="Cambria"/>
+                <a:cs typeface="Helvetica"/>
+              </a:rPr>
+              <a:t/>
+            </a:r>
+            <a:br>
+              <a:rPr lang="en-US" sz="1600" dirty="0">
+                <a:latin typeface="Cambria"/>
+                <a:cs typeface="Helvetica"/>
+              </a:rPr>
+            </a:br>
+            <a:r>
+              <a:rPr lang="en-US" sz="1600" dirty="0">
+                <a:latin typeface="Cambria"/>
+                <a:ea typeface="Cambria"/>
+                <a:cs typeface="Helvetica"/>
+              </a:rPr>
+              <a:t>1. </a:t>
+            </a:r>
+            <a:r>
+              <a:rPr lang="en-US" sz="1600" dirty="0" err="1">
+                <a:latin typeface="Cambria"/>
+                <a:ea typeface="Cambria"/>
+                <a:cs typeface="Helvetica"/>
+              </a:rPr>
+              <a:t>DistilBert</a:t>
+            </a:r>
+            <a:r>
+              <a:rPr lang="en-US" sz="1600" dirty="0">
+                <a:latin typeface="Cambria"/>
+                <a:ea typeface="Cambria"/>
+                <a:cs typeface="Helvetica"/>
+              </a:rPr>
+              <a:t> Model - 85%</a:t>
+            </a:r>
+            <a:r>
+              <a:rPr lang="en-US" sz="1600" dirty="0">
+                <a:latin typeface="Cambria"/>
+                <a:cs typeface="Helvetica"/>
+              </a:rPr>
+              <a:t/>
+            </a:r>
+            <a:br>
+              <a:rPr lang="en-US" sz="1600" dirty="0">
+                <a:latin typeface="Cambria"/>
+                <a:cs typeface="Helvetica"/>
+              </a:rPr>
+            </a:br>
+            <a:r>
+              <a:rPr lang="en-US" sz="1600" dirty="0">
+                <a:latin typeface="Cambria"/>
+                <a:ea typeface="Cambria"/>
+                <a:cs typeface="Helvetica"/>
+              </a:rPr>
+              <a:t> 2. Logistic Regression- 79%</a:t>
+            </a:r>
+            <a:r>
+              <a:rPr lang="en-US" sz="1600" dirty="0">
+                <a:latin typeface="Cambria"/>
+                <a:cs typeface="Helvetica"/>
+              </a:rPr>
+              <a:t/>
+            </a:r>
+            <a:br>
+              <a:rPr lang="en-US" sz="1600" dirty="0">
+                <a:latin typeface="Cambria"/>
+                <a:cs typeface="Helvetica"/>
+              </a:rPr>
+            </a:br>
+            <a:r>
+              <a:rPr lang="en-US" sz="1600" dirty="0">
+                <a:latin typeface="Cambria"/>
+                <a:ea typeface="Cambria"/>
+                <a:cs typeface="Helvetica"/>
+              </a:rPr>
+              <a:t> 3. XG Boost - 79%</a:t>
+            </a:r>
+            <a:r>
+              <a:rPr lang="en-US" sz="1600" dirty="0">
+                <a:latin typeface="Cambria"/>
+                <a:cs typeface="Helvetica"/>
+              </a:rPr>
+              <a:t/>
+            </a:r>
+            <a:br>
+              <a:rPr lang="en-US" sz="1600" dirty="0">
+                <a:latin typeface="Cambria"/>
+                <a:cs typeface="Helvetica"/>
+              </a:rPr>
+            </a:br>
+            <a:r>
+              <a:rPr lang="en-US" sz="1600" dirty="0">
+                <a:latin typeface="Cambria"/>
+                <a:ea typeface="Cambria"/>
+                <a:cs typeface="Helvetica"/>
+              </a:rPr>
+              <a:t> 4. Text CNN - 78%</a:t>
+            </a:r>
+            <a:r>
+              <a:rPr lang="en-US" sz="1600" dirty="0">
+                <a:latin typeface="Cambria"/>
+                <a:cs typeface="Helvetica"/>
+              </a:rPr>
+              <a:t/>
+            </a:r>
+            <a:br>
+              <a:rPr lang="en-US" sz="1600" dirty="0">
+                <a:latin typeface="Cambria"/>
+                <a:cs typeface="Helvetica"/>
+              </a:rPr>
+            </a:br>
+            <a:r>
+              <a:rPr lang="en-US" sz="1600" dirty="0">
+                <a:latin typeface="Cambria"/>
+                <a:ea typeface="Cambria"/>
+                <a:cs typeface="Helvetica"/>
+              </a:rPr>
+              <a:t> 5. Naive Bayes - 77%</a:t>
+            </a:r>
+            <a:r>
+              <a:rPr lang="en-US" sz="1600" dirty="0">
+                <a:latin typeface="Cambria"/>
+                <a:cs typeface="Helvetica"/>
+              </a:rPr>
+              <a:t/>
+            </a:r>
+            <a:br>
+              <a:rPr lang="en-US" sz="1600" dirty="0">
+                <a:latin typeface="Cambria"/>
+                <a:cs typeface="Helvetica"/>
+              </a:rPr>
+            </a:br>
+            <a:r>
+              <a:rPr lang="en-US" sz="1600" dirty="0">
+                <a:latin typeface="Cambria"/>
+                <a:ea typeface="Cambria"/>
+                <a:cs typeface="Helvetica"/>
+              </a:rPr>
+              <a:t> 6. Random forest - 76%</a:t>
+            </a:r>
+            <a:r>
+              <a:rPr lang="en-US" sz="1600" dirty="0">
+                <a:latin typeface="Cambria"/>
+                <a:cs typeface="Helvetica"/>
+              </a:rPr>
+              <a:t/>
+            </a:r>
+            <a:br>
+              <a:rPr lang="en-US" sz="1600" dirty="0">
+                <a:latin typeface="Cambria"/>
+                <a:cs typeface="Helvetica"/>
+              </a:rPr>
+            </a:br>
+            <a:r>
+              <a:rPr lang="en-US" sz="1600" dirty="0">
+                <a:latin typeface="Cambria"/>
+                <a:ea typeface="Cambria"/>
+                <a:cs typeface="Helvetica"/>
+              </a:rPr>
+              <a:t> </a:t>
+            </a:r>
+            <a:endParaRPr lang="en-US" sz="1600" dirty="0">
+              <a:latin typeface="Cambria"/>
+              <a:ea typeface="Cambria"/>
+            </a:endParaRPr>
+          </a:p>
+        </p:txBody>
+      </p:sp>
+      <p:pic>
+        <p:nvPicPr>
+          <p:cNvPr id="4" name="Picture 3"/>
+          <p:cNvPicPr>
+            <a:picLocks noChangeAspect="1"/>
+          </p:cNvPicPr>
+          <p:nvPr/>
+        </p:nvPicPr>
+        <p:blipFill>
+          <a:blip r:embed="rId2"/>
+          <a:stretch>
+            <a:fillRect/>
+          </a:stretch>
+        </p:blipFill>
+        <p:spPr>
+          <a:xfrm>
+            <a:off x="5505060" y="0"/>
+            <a:ext cx="6686940" cy="6858000"/>
+          </a:xfrm>
+          <a:prstGeom prst="rect">
+            <a:avLst/>
+          </a:prstGeom>
+        </p:spPr>
+      </p:pic>
+    </p:spTree>
+    <p:extLst>
+      <p:ext uri="{BB962C8B-B14F-4D97-AF65-F5344CB8AC3E}">
+        <p14:creationId xmlns:p14="http://schemas.microsoft.com/office/powerpoint/2010/main" val="2927179923"/>
+      </p:ext>
+    </p:extLst>
+  </p:cSld>
+  <p:clrMapOvr>
+    <a:masterClrMapping/>
+  </p:clrMapOvr>
+</p:sld>
+</file>
+
+<file path=ppt/slides/slide11.xml><?xml version="1.0" encoding="utf-8"?>
+<p:sld xmlns:a="http://schemas.openxmlformats.org/drawingml/2006/main" xmlns:r="http://schemas.openxmlformats.org/officeDocument/2006/relationships" xmlns:p="http://schemas.openxmlformats.org/presentationml/2006/main">
+  <p:cSld>
+    <p:bg>
+      <p:bgPr>
+        <a:solidFill>
+          <a:schemeClr val="bg1"/>
+        </a:solidFill>
+        <a:effectLst/>
+      </p:bgPr>
+    </p:bg>
+    <p:spTree>
+      <p:nvGrpSpPr>
+        <p:cNvPr id="1" name=""/>
+        <p:cNvGrpSpPr/>
+        <p:nvPr/>
+      </p:nvGrpSpPr>
+      <p:grpSpPr>
+        <a:xfrm>
+          <a:off x="0" y="0"/>
+          <a:ext cx="0" cy="0"/>
+          <a:chOff x="0" y="0"/>
+          <a:chExt cx="0" cy="0"/>
+        </a:xfrm>
+      </p:grpSpPr>
       <p:cxnSp>
         <p:nvCxnSpPr>
           <p:cNvPr id="9" name="Straight Connector 8">
@@ -7147,7 +7648,7 @@
 </p:sld>
 </file>
 
-<file path=ppt/slides/slide11.xml><?xml version="1.0" encoding="utf-8"?>
+<file path=ppt/slides/slide12.xml><?xml version="1.0" encoding="utf-8"?>
 <p:sld xmlns:a="http://schemas.openxmlformats.org/drawingml/2006/main" xmlns:r="http://schemas.openxmlformats.org/officeDocument/2006/relationships" xmlns:p="http://schemas.openxmlformats.org/presentationml/2006/main">
   <p:cSld>
     <p:bg>
@@ -7467,7 +7968,7 @@
 </p:sld>
 </file>
 
-<file path=ppt/slides/slide12.xml><?xml version="1.0" encoding="utf-8"?>
+<file path=ppt/slides/slide13.xml><?xml version="1.0" encoding="utf-8"?>
 <p:sld xmlns:a="http://schemas.openxmlformats.org/drawingml/2006/main" xmlns:r="http://schemas.openxmlformats.org/officeDocument/2006/relationships" xmlns:p="http://schemas.openxmlformats.org/presentationml/2006/main">
   <p:cSld>
     <p:bg>
@@ -7752,7 +8253,7 @@
 </p:sld>
 </file>
 
-<file path=ppt/slides/slide13.xml><?xml version="1.0" encoding="utf-8"?>
+<file path=ppt/slides/slide14.xml><?xml version="1.0" encoding="utf-8"?>
 <p:sld xmlns:a="http://schemas.openxmlformats.org/drawingml/2006/main" xmlns:r="http://schemas.openxmlformats.org/officeDocument/2006/relationships" xmlns:p="http://schemas.openxmlformats.org/presentationml/2006/main">
   <p:cSld>
     <p:bg>
@@ -8029,7 +8530,7 @@
 </p:sld>
 </file>
 
-<file path=ppt/slides/slide14.xml><?xml version="1.0" encoding="utf-8"?>
+<file path=ppt/slides/slide15.xml><?xml version="1.0" encoding="utf-8"?>
 <p:sld xmlns:a="http://schemas.openxmlformats.org/drawingml/2006/main" xmlns:r="http://schemas.openxmlformats.org/officeDocument/2006/relationships" xmlns:p="http://schemas.openxmlformats.org/presentationml/2006/main">
   <p:cSld>
     <p:bg>
@@ -8399,7 +8900,7 @@
 </p:sld>
 </file>
 
-<file path=ppt/slides/slide15.xml><?xml version="1.0" encoding="utf-8"?>
+<file path=ppt/slides/slide16.xml><?xml version="1.0" encoding="utf-8"?>
 <p:sld xmlns:a="http://schemas.openxmlformats.org/drawingml/2006/main" xmlns:r="http://schemas.openxmlformats.org/officeDocument/2006/relationships" xmlns:p="http://schemas.openxmlformats.org/presentationml/2006/main">
   <p:cSld>
     <p:bg>
@@ -8746,7 +9247,7 @@
 </p:sld>
 </file>
 
-<file path=ppt/slides/slide16.xml><?xml version="1.0" encoding="utf-8"?>
+<file path=ppt/slides/slide17.xml><?xml version="1.0" encoding="utf-8"?>
 <p:sld xmlns:a="http://schemas.openxmlformats.org/drawingml/2006/main" xmlns:r="http://schemas.openxmlformats.org/officeDocument/2006/relationships" xmlns:p="http://schemas.openxmlformats.org/presentationml/2006/main">
   <p:cSld>
     <p:bg>
@@ -9074,7 +9575,7 @@
 </p:sld>
 </file>
 
-<file path=ppt/slides/slide17.xml><?xml version="1.0" encoding="utf-8"?>
+<file path=ppt/slides/slide18.xml><?xml version="1.0" encoding="utf-8"?>
 <p:sld xmlns:a="http://schemas.openxmlformats.org/drawingml/2006/main" xmlns:r="http://schemas.openxmlformats.org/officeDocument/2006/relationships" xmlns:p="http://schemas.openxmlformats.org/presentationml/2006/main">
   <p:cSld>
     <p:spTree>
@@ -9227,7 +9728,7 @@
 </p:sld>
 </file>
 
-<file path=ppt/slides/slide18.xml><?xml version="1.0" encoding="utf-8"?>
+<file path=ppt/slides/slide19.xml><?xml version="1.0" encoding="utf-8"?>
 <p:sld xmlns:a="http://schemas.openxmlformats.org/drawingml/2006/main" xmlns:r="http://schemas.openxmlformats.org/officeDocument/2006/relationships" xmlns:p="http://schemas.openxmlformats.org/presentationml/2006/main">
   <p:cSld>
     <p:bg>
@@ -9558,7 +10059,7 @@
 </p:sld>
 </file>
 
-<file path=ppt/slides/slide19.xml><?xml version="1.0" encoding="utf-8"?>
+<file path=ppt/slides/slide2.xml><?xml version="1.0" encoding="utf-8"?>
 <p:sld xmlns:a="http://schemas.openxmlformats.org/drawingml/2006/main" xmlns:r="http://schemas.openxmlformats.org/officeDocument/2006/relationships" xmlns:p="http://schemas.openxmlformats.org/presentationml/2006/main">
   <p:cSld>
     <p:bg>
@@ -9588,7 +10089,7 @@
           <p:cNvPr id="9" name="Rectangle 8">
             <a:extLst>
               <a:ext uri="{FF2B5EF4-FFF2-40B4-BE49-F238E27FC236}">
-                <a16:creationId xmlns:a16="http://schemas.microsoft.com/office/drawing/2014/main" id="{F68B2C62-7648-4430-90D5-AE0F252AF113}"/>
+                <a16:creationId xmlns:a16="http://schemas.microsoft.com/office/drawing/2014/main" id="{E49D7415-2F11-44C2-B6AA-13A25B6814B9}"/>
               </a:ext>
               <a:ext uri="{C183D7F6-B498-43B3-948B-1728B52AA6E4}">
                 <adec:decorative xmlns:adec="http://schemas.microsoft.com/office/drawing/2017/decorative" xmlns="" val="1"/>
@@ -9664,7 +10165,7 @@
           <p:cNvPr id="2" name="Title 1">
             <a:extLst>
               <a:ext uri="{FF2B5EF4-FFF2-40B4-BE49-F238E27FC236}">
-                <a16:creationId xmlns:a16="http://schemas.microsoft.com/office/drawing/2014/main" id="{1B9F3148-FF56-1F61-6763-5A285CA4DE8D}"/>
+                <a16:creationId xmlns:a16="http://schemas.microsoft.com/office/drawing/2014/main" id="{7C6AB574-3A85-731E-A48A-600AAFB69A31}"/>
               </a:ext>
             </a:extLst>
           </p:cNvPr>
@@ -9677,8 +10178,8 @@
         </p:nvSpPr>
         <p:spPr>
           <a:xfrm>
-            <a:off x="700087" y="909638"/>
-            <a:ext cx="10691813" cy="1155618"/>
+            <a:off x="704088" y="914400"/>
+            <a:ext cx="5195889" cy="1316736"/>
           </a:xfrm>
         </p:spPr>
         <p:txBody>
@@ -9687,16 +10188,29 @@
           </a:bodyPr>
           <a:lstStyle/>
           <a:p>
-            <a:r>
-              <a:rPr lang="en-US">
+            <a:pPr>
+              <a:lnSpc>
+                <a:spcPct val="90000"/>
+              </a:lnSpc>
+            </a:pPr>
+            <a:r>
+              <a:rPr lang="en-US" sz="2800">
                 <a:effectLst/>
                 <a:latin typeface="Cambria" panose="02040503050406030204" pitchFamily="18" charset="0"/>
                 <a:ea typeface="MS Mincho" panose="02020609040205080304" pitchFamily="49" charset="-128"/>
                 <a:cs typeface="Times New Roman" panose="02020603050405020304" pitchFamily="18" charset="0"/>
               </a:rPr>
-              <a:t>Future Work</a:t>
-            </a:r>
-            <a:endParaRPr lang="en-US"/>
+              <a:t> Business Understanding</a:t>
+            </a:r>
+            <a:br>
+              <a:rPr lang="en-US" sz="2800">
+                <a:effectLst/>
+                <a:latin typeface="Cambria" panose="02040503050406030204" pitchFamily="18" charset="0"/>
+                <a:ea typeface="MS Mincho" panose="02020609040205080304" pitchFamily="49" charset="-128"/>
+                <a:cs typeface="Times New Roman" panose="02020603050405020304" pitchFamily="18" charset="0"/>
+              </a:rPr>
+            </a:br>
+            <a:endParaRPr lang="en-US" sz="2800"/>
           </a:p>
         </p:txBody>
       </p:sp>
@@ -9705,7 +10219,7 @@
           <p:cNvPr id="11" name="Straight Connector 10">
             <a:extLst>
               <a:ext uri="{FF2B5EF4-FFF2-40B4-BE49-F238E27FC236}">
-                <a16:creationId xmlns:a16="http://schemas.microsoft.com/office/drawing/2014/main" id="{AAD0195E-7F27-4D06-9427-0C121D721A14}"/>
+                <a16:creationId xmlns:a16="http://schemas.microsoft.com/office/drawing/2014/main" id="{F2B951FD-94F7-E138-3EC2-A66A551D9137}"/>
               </a:ext>
               <a:ext uri="{C183D7F6-B498-43B3-948B-1728B52AA6E4}">
                 <adec:decorative xmlns:adec="http://schemas.microsoft.com/office/drawing/2017/decorative" xmlns="" val="1"/>
@@ -9725,8 +10239,8 @@
         </p:nvCxnSpPr>
         <p:spPr>
           <a:xfrm>
-            <a:off x="800100" y="723900"/>
-            <a:ext cx="10591800" cy="0"/>
+            <a:off x="804672" y="722376"/>
+            <a:ext cx="1638300" cy="0"/>
           </a:xfrm>
           <a:prstGeom prst="line">
             <a:avLst/>
@@ -9752,93 +10266,148 @@
           </a:fontRef>
         </p:style>
       </p:cxnSp>
-      <p:cxnSp>
-        <p:nvCxnSpPr>
-          <p:cNvPr id="13" name="Straight Connector 12">
-            <a:extLst>
-              <a:ext uri="{FF2B5EF4-FFF2-40B4-BE49-F238E27FC236}">
-                <a16:creationId xmlns:a16="http://schemas.microsoft.com/office/drawing/2014/main" id="{9D74C2FC-3228-4FC1-B97B-87AD35508D91}"/>
-              </a:ext>
-              <a:ext uri="{C183D7F6-B498-43B3-948B-1728B52AA6E4}">
-                <adec:decorative xmlns:adec="http://schemas.microsoft.com/office/drawing/2017/decorative" xmlns="" val="1"/>
-              </a:ext>
-            </a:extLst>
-          </p:cNvPr>
-          <p:cNvCxnSpPr>
-            <a:cxnSpLocks noGrp="1" noRot="1" noChangeAspect="1" noMove="1" noResize="1" noEditPoints="1" noAdjustHandles="1" noChangeArrowheads="1" noChangeShapeType="1"/>
-          </p:cNvCxnSpPr>
-          <p:nvPr>
-            <p:extLst>
-              <p:ext uri="{386F3935-93C4-4BCD-93E2-E3B085C9AB24}">
-                <p16:designElem xmlns:p16="http://schemas.microsoft.com/office/powerpoint/2015/main" val="1"/>
-              </p:ext>
-            </p:extLst>
-          </p:nvPr>
-        </p:nvCxnSpPr>
+      <p:sp>
+        <p:nvSpPr>
+          <p:cNvPr id="3" name="Content Placeholder 2">
+            <a:extLst>
+              <a:ext uri="{FF2B5EF4-FFF2-40B4-BE49-F238E27FC236}">
+                <a16:creationId xmlns:a16="http://schemas.microsoft.com/office/drawing/2014/main" id="{48C63268-2EB6-E421-78D9-31FD479BC589}"/>
+              </a:ext>
+            </a:extLst>
+          </p:cNvPr>
+          <p:cNvSpPr>
+            <a:spLocks noGrp="1"/>
+          </p:cNvSpPr>
+          <p:nvPr>
+            <p:ph idx="1"/>
+          </p:nvPr>
+        </p:nvSpPr>
         <p:spPr>
           <a:xfrm>
-            <a:off x="800100" y="6142781"/>
-            <a:ext cx="10591800" cy="0"/>
+            <a:off x="704088" y="2231136"/>
+            <a:ext cx="5195889" cy="3931920"/>
           </a:xfrm>
-          <a:prstGeom prst="line">
+        </p:spPr>
+        <p:txBody>
+          <a:bodyPr vert="horz" lIns="91440" tIns="45720" rIns="91440" bIns="45720" rtlCol="0" anchor="t">
+            <a:normAutofit/>
+          </a:bodyPr>
+          <a:lstStyle/>
+          <a:p>
+            <a:pPr>
+              <a:lnSpc>
+                <a:spcPct val="100000"/>
+              </a:lnSpc>
+            </a:pPr>
+            <a:r>
+              <a:rPr lang="en-US" sz="1700">
+                <a:effectLst/>
+                <a:latin typeface="Cambria"/>
+                <a:ea typeface="MS Mincho"/>
+                <a:cs typeface="Times New Roman"/>
+              </a:rPr>
+              <a:t>The rapid growth of e-marketplaces like Amazon has led to an enormous amount of customer-generated data,</a:t>
+            </a:r>
+            <a:r>
+              <a:rPr lang="en-US" sz="1700">
+                <a:latin typeface="Cambria"/>
+                <a:ea typeface="MS Mincho"/>
+                <a:cs typeface="Times New Roman"/>
+              </a:rPr>
+              <a:t> </a:t>
+            </a:r>
+            <a:r>
+              <a:rPr lang="en-US" sz="1700">
+                <a:effectLst/>
+                <a:latin typeface="Cambria"/>
+                <a:ea typeface="MS Mincho"/>
+                <a:cs typeface="Times New Roman"/>
+              </a:rPr>
+              <a:t>such as product reviews, ratings, and feedback. </a:t>
+            </a:r>
+            <a:endParaRPr lang="en-US"/>
+          </a:p>
+          <a:p>
+            <a:pPr>
+              <a:lnSpc>
+                <a:spcPct val="100000"/>
+              </a:lnSpc>
+            </a:pPr>
+            <a:r>
+              <a:rPr lang="en-US" sz="1700">
+                <a:effectLst/>
+                <a:latin typeface="Cambria"/>
+                <a:ea typeface="MS Mincho"/>
+                <a:cs typeface="Times New Roman"/>
+              </a:rPr>
+              <a:t>This data contains important information regarding customer feedback, that can directly affect business decisions like product improvements, marketing campaigns, and customer reach programs.</a:t>
+            </a:r>
+            <a:endParaRPr lang="en-US">
+              <a:latin typeface="Calisto MT"/>
+              <a:ea typeface="MS Mincho"/>
+              <a:cs typeface="Times New Roman"/>
+            </a:endParaRPr>
+          </a:p>
+          <a:p>
+            <a:pPr>
+              <a:lnSpc>
+                <a:spcPct val="100000"/>
+              </a:lnSpc>
+            </a:pPr>
+            <a:r>
+              <a:rPr lang="en-US" sz="1700">
+                <a:effectLst/>
+                <a:latin typeface="Cambria"/>
+                <a:ea typeface="MS Mincho"/>
+                <a:cs typeface="Times New Roman"/>
+              </a:rPr>
+              <a:t>For food business firms, understanding customer sentiment regarding their products is critical to product quality, improvement and customer satisfaction.</a:t>
+            </a:r>
+            <a:endParaRPr lang="en-US"/>
+          </a:p>
+          <a:p>
+            <a:pPr>
+              <a:lnSpc>
+                <a:spcPct val="100000"/>
+              </a:lnSpc>
+            </a:pPr>
+            <a:endParaRPr lang="en-US" sz="1700"/>
+          </a:p>
+        </p:txBody>
+      </p:sp>
+      <p:pic>
+        <p:nvPicPr>
+          <p:cNvPr id="5" name="Picture 4" descr="Fruits and vegetables in bags">
+            <a:extLst>
+              <a:ext uri="{FF2B5EF4-FFF2-40B4-BE49-F238E27FC236}">
+                <a16:creationId xmlns:a16="http://schemas.microsoft.com/office/drawing/2014/main" id="{A3CC0A9C-35BB-821A-9805-BB6D8E2237CF}"/>
+              </a:ext>
+            </a:extLst>
+          </p:cNvPr>
+          <p:cNvPicPr>
+            <a:picLocks noChangeAspect="1"/>
+          </p:cNvPicPr>
+          <p:nvPr/>
+        </p:nvPicPr>
+        <p:blipFill>
+          <a:blip r:embed="rId2"/>
+          <a:srcRect l="35851" r="7976" b="-2"/>
+          <a:stretch/>
+        </p:blipFill>
+        <p:spPr>
+          <a:xfrm>
+            <a:off x="6420752" y="-1"/>
+            <a:ext cx="5771248" cy="6857999"/>
+          </a:xfrm>
+          <a:prstGeom prst="rect">
             <a:avLst/>
           </a:prstGeom>
-          <a:ln w="12700">
-            <a:solidFill>
-              <a:schemeClr val="tx1"/>
-            </a:solidFill>
-          </a:ln>
         </p:spPr>
-        <p:style>
-          <a:lnRef idx="1">
-            <a:schemeClr val="accent1"/>
-          </a:lnRef>
-          <a:fillRef idx="0">
-            <a:schemeClr val="accent1"/>
-          </a:fillRef>
-          <a:effectRef idx="0">
-            <a:schemeClr val="accent1"/>
-          </a:effectRef>
-          <a:fontRef idx="minor">
-            <a:schemeClr val="tx1"/>
-          </a:fontRef>
-        </p:style>
-      </p:cxnSp>
-      <p:graphicFrame>
-        <p:nvGraphicFramePr>
-          <p:cNvPr id="6" name="Content Placeholder 2">
-            <a:extLst>
-              <a:ext uri="{FF2B5EF4-FFF2-40B4-BE49-F238E27FC236}">
-                <a16:creationId xmlns:a16="http://schemas.microsoft.com/office/drawing/2014/main" id="{372CC5D4-A8EE-12D0-0718-083495ACAF38}"/>
-              </a:ext>
-            </a:extLst>
-          </p:cNvPr>
-          <p:cNvGraphicFramePr>
-            <a:graphicFrameLocks noGrp="1"/>
-          </p:cNvGraphicFramePr>
-          <p:nvPr>
-            <p:ph idx="1"/>
-            <p:extLst>
-              <p:ext uri="{D42A27DB-BD31-4B8C-83A1-F6EECF244321}">
-                <p14:modId xmlns:p14="http://schemas.microsoft.com/office/powerpoint/2010/main" val="1990463114"/>
-              </p:ext>
-            </p:extLst>
-          </p:nvPr>
-        </p:nvGraphicFramePr>
-        <p:xfrm>
-          <a:off x="700088" y="2222500"/>
-          <a:ext cx="10691812" cy="3740150"/>
-        </p:xfrm>
-        <a:graphic>
-          <a:graphicData uri="http://schemas.openxmlformats.org/drawingml/2006/diagram">
-            <dgm:relIds xmlns:dgm="http://schemas.openxmlformats.org/drawingml/2006/diagram" xmlns:r="http://schemas.openxmlformats.org/officeDocument/2006/relationships" r:dm="rId2" r:lo="rId3" r:qs="rId4" r:cs="rId5"/>
-          </a:graphicData>
-        </a:graphic>
-      </p:graphicFrame>
+      </p:pic>
     </p:spTree>
     <p:extLst>
       <p:ext uri="{BB962C8B-B14F-4D97-AF65-F5344CB8AC3E}">
-        <p14:creationId xmlns:p14="http://schemas.microsoft.com/office/powerpoint/2010/main" val="3243244310"/>
+        <p14:creationId xmlns:p14="http://schemas.microsoft.com/office/powerpoint/2010/main" val="2003370814"/>
       </p:ext>
     </p:extLst>
   </p:cSld>
@@ -9848,7 +10417,7 @@
 </p:sld>
 </file>
 
-<file path=ppt/slides/slide2.xml><?xml version="1.0" encoding="utf-8"?>
+<file path=ppt/slides/slide20.xml><?xml version="1.0" encoding="utf-8"?>
 <p:sld xmlns:a="http://schemas.openxmlformats.org/drawingml/2006/main" xmlns:r="http://schemas.openxmlformats.org/officeDocument/2006/relationships" xmlns:p="http://schemas.openxmlformats.org/presentationml/2006/main">
   <p:cSld>
     <p:bg>
@@ -9878,7 +10447,7 @@
           <p:cNvPr id="9" name="Rectangle 8">
             <a:extLst>
               <a:ext uri="{FF2B5EF4-FFF2-40B4-BE49-F238E27FC236}">
-                <a16:creationId xmlns:a16="http://schemas.microsoft.com/office/drawing/2014/main" id="{E49D7415-2F11-44C2-B6AA-13A25B6814B9}"/>
+                <a16:creationId xmlns:a16="http://schemas.microsoft.com/office/drawing/2014/main" id="{F68B2C62-7648-4430-90D5-AE0F252AF113}"/>
               </a:ext>
               <a:ext uri="{C183D7F6-B498-43B3-948B-1728B52AA6E4}">
                 <adec:decorative xmlns:adec="http://schemas.microsoft.com/office/drawing/2017/decorative" xmlns="" val="1"/>
@@ -9954,7 +10523,7 @@
           <p:cNvPr id="2" name="Title 1">
             <a:extLst>
               <a:ext uri="{FF2B5EF4-FFF2-40B4-BE49-F238E27FC236}">
-                <a16:creationId xmlns:a16="http://schemas.microsoft.com/office/drawing/2014/main" id="{7C6AB574-3A85-731E-A48A-600AAFB69A31}"/>
+                <a16:creationId xmlns:a16="http://schemas.microsoft.com/office/drawing/2014/main" id="{1B9F3148-FF56-1F61-6763-5A285CA4DE8D}"/>
               </a:ext>
             </a:extLst>
           </p:cNvPr>
@@ -9967,8 +10536,8 @@
         </p:nvSpPr>
         <p:spPr>
           <a:xfrm>
-            <a:off x="704088" y="914400"/>
-            <a:ext cx="5195889" cy="1316736"/>
+            <a:off x="700087" y="909638"/>
+            <a:ext cx="10691813" cy="1155618"/>
           </a:xfrm>
         </p:spPr>
         <p:txBody>
@@ -9977,29 +10546,16 @@
           </a:bodyPr>
           <a:lstStyle/>
           <a:p>
-            <a:pPr>
-              <a:lnSpc>
-                <a:spcPct val="90000"/>
-              </a:lnSpc>
-            </a:pPr>
-            <a:r>
-              <a:rPr lang="en-US" sz="2800">
+            <a:r>
+              <a:rPr lang="en-US">
                 <a:effectLst/>
                 <a:latin typeface="Cambria" panose="02040503050406030204" pitchFamily="18" charset="0"/>
                 <a:ea typeface="MS Mincho" panose="02020609040205080304" pitchFamily="49" charset="-128"/>
                 <a:cs typeface="Times New Roman" panose="02020603050405020304" pitchFamily="18" charset="0"/>
               </a:rPr>
-              <a:t> Business Understanding</a:t>
-            </a:r>
-            <a:br>
-              <a:rPr lang="en-US" sz="2800">
-                <a:effectLst/>
-                <a:latin typeface="Cambria" panose="02040503050406030204" pitchFamily="18" charset="0"/>
-                <a:ea typeface="MS Mincho" panose="02020609040205080304" pitchFamily="49" charset="-128"/>
-                <a:cs typeface="Times New Roman" panose="02020603050405020304" pitchFamily="18" charset="0"/>
-              </a:rPr>
-            </a:br>
-            <a:endParaRPr lang="en-US" sz="2800"/>
+              <a:t>Future Work</a:t>
+            </a:r>
+            <a:endParaRPr lang="en-US"/>
           </a:p>
         </p:txBody>
       </p:sp>
@@ -10008,7 +10564,7 @@
           <p:cNvPr id="11" name="Straight Connector 10">
             <a:extLst>
               <a:ext uri="{FF2B5EF4-FFF2-40B4-BE49-F238E27FC236}">
-                <a16:creationId xmlns:a16="http://schemas.microsoft.com/office/drawing/2014/main" id="{F2B951FD-94F7-E138-3EC2-A66A551D9137}"/>
+                <a16:creationId xmlns:a16="http://schemas.microsoft.com/office/drawing/2014/main" id="{AAD0195E-7F27-4D06-9427-0C121D721A14}"/>
               </a:ext>
               <a:ext uri="{C183D7F6-B498-43B3-948B-1728B52AA6E4}">
                 <adec:decorative xmlns:adec="http://schemas.microsoft.com/office/drawing/2017/decorative" xmlns="" val="1"/>
@@ -10028,8 +10584,8 @@
         </p:nvCxnSpPr>
         <p:spPr>
           <a:xfrm>
-            <a:off x="804672" y="722376"/>
-            <a:ext cx="1638300" cy="0"/>
+            <a:off x="800100" y="723900"/>
+            <a:ext cx="10591800" cy="0"/>
           </a:xfrm>
           <a:prstGeom prst="line">
             <a:avLst/>
@@ -10055,148 +10611,93 @@
           </a:fontRef>
         </p:style>
       </p:cxnSp>
-      <p:sp>
-        <p:nvSpPr>
-          <p:cNvPr id="3" name="Content Placeholder 2">
-            <a:extLst>
-              <a:ext uri="{FF2B5EF4-FFF2-40B4-BE49-F238E27FC236}">
-                <a16:creationId xmlns:a16="http://schemas.microsoft.com/office/drawing/2014/main" id="{48C63268-2EB6-E421-78D9-31FD479BC589}"/>
-              </a:ext>
-            </a:extLst>
-          </p:cNvPr>
-          <p:cNvSpPr>
-            <a:spLocks noGrp="1"/>
-          </p:cNvSpPr>
-          <p:nvPr>
-            <p:ph idx="1"/>
-          </p:nvPr>
-        </p:nvSpPr>
+      <p:cxnSp>
+        <p:nvCxnSpPr>
+          <p:cNvPr id="13" name="Straight Connector 12">
+            <a:extLst>
+              <a:ext uri="{FF2B5EF4-FFF2-40B4-BE49-F238E27FC236}">
+                <a16:creationId xmlns:a16="http://schemas.microsoft.com/office/drawing/2014/main" id="{9D74C2FC-3228-4FC1-B97B-87AD35508D91}"/>
+              </a:ext>
+              <a:ext uri="{C183D7F6-B498-43B3-948B-1728B52AA6E4}">
+                <adec:decorative xmlns:adec="http://schemas.microsoft.com/office/drawing/2017/decorative" xmlns="" val="1"/>
+              </a:ext>
+            </a:extLst>
+          </p:cNvPr>
+          <p:cNvCxnSpPr>
+            <a:cxnSpLocks noGrp="1" noRot="1" noChangeAspect="1" noMove="1" noResize="1" noEditPoints="1" noAdjustHandles="1" noChangeArrowheads="1" noChangeShapeType="1"/>
+          </p:cNvCxnSpPr>
+          <p:nvPr>
+            <p:extLst>
+              <p:ext uri="{386F3935-93C4-4BCD-93E2-E3B085C9AB24}">
+                <p16:designElem xmlns:p16="http://schemas.microsoft.com/office/powerpoint/2015/main" val="1"/>
+              </p:ext>
+            </p:extLst>
+          </p:nvPr>
+        </p:nvCxnSpPr>
         <p:spPr>
           <a:xfrm>
-            <a:off x="704088" y="2231136"/>
-            <a:ext cx="5195889" cy="3931920"/>
+            <a:off x="800100" y="6142781"/>
+            <a:ext cx="10591800" cy="0"/>
           </a:xfrm>
-        </p:spPr>
-        <p:txBody>
-          <a:bodyPr vert="horz" lIns="91440" tIns="45720" rIns="91440" bIns="45720" rtlCol="0" anchor="t">
-            <a:normAutofit/>
-          </a:bodyPr>
-          <a:lstStyle/>
-          <a:p>
-            <a:pPr>
-              <a:lnSpc>
-                <a:spcPct val="100000"/>
-              </a:lnSpc>
-            </a:pPr>
-            <a:r>
-              <a:rPr lang="en-US" sz="1700">
-                <a:effectLst/>
-                <a:latin typeface="Cambria"/>
-                <a:ea typeface="MS Mincho"/>
-                <a:cs typeface="Times New Roman"/>
-              </a:rPr>
-              <a:t>The rapid growth of e-marketplaces like Amazon has led to an enormous amount of customer-generated data,</a:t>
-            </a:r>
-            <a:r>
-              <a:rPr lang="en-US" sz="1700">
-                <a:latin typeface="Cambria"/>
-                <a:ea typeface="MS Mincho"/>
-                <a:cs typeface="Times New Roman"/>
-              </a:rPr>
-              <a:t> </a:t>
-            </a:r>
-            <a:r>
-              <a:rPr lang="en-US" sz="1700">
-                <a:effectLst/>
-                <a:latin typeface="Cambria"/>
-                <a:ea typeface="MS Mincho"/>
-                <a:cs typeface="Times New Roman"/>
-              </a:rPr>
-              <a:t>such as product reviews, ratings, and feedback. </a:t>
-            </a:r>
-            <a:endParaRPr lang="en-US"/>
-          </a:p>
-          <a:p>
-            <a:pPr>
-              <a:lnSpc>
-                <a:spcPct val="100000"/>
-              </a:lnSpc>
-            </a:pPr>
-            <a:r>
-              <a:rPr lang="en-US" sz="1700">
-                <a:effectLst/>
-                <a:latin typeface="Cambria"/>
-                <a:ea typeface="MS Mincho"/>
-                <a:cs typeface="Times New Roman"/>
-              </a:rPr>
-              <a:t>This data contains important information regarding customer feedback, that can directly affect business decisions like product improvements, marketing campaigns, and customer reach programs.</a:t>
-            </a:r>
-            <a:endParaRPr lang="en-US">
-              <a:latin typeface="Calisto MT"/>
-              <a:ea typeface="MS Mincho"/>
-              <a:cs typeface="Times New Roman"/>
-            </a:endParaRPr>
-          </a:p>
-          <a:p>
-            <a:pPr>
-              <a:lnSpc>
-                <a:spcPct val="100000"/>
-              </a:lnSpc>
-            </a:pPr>
-            <a:r>
-              <a:rPr lang="en-US" sz="1700">
-                <a:effectLst/>
-                <a:latin typeface="Cambria"/>
-                <a:ea typeface="MS Mincho"/>
-                <a:cs typeface="Times New Roman"/>
-              </a:rPr>
-              <a:t>For food business firms, understanding customer sentiment regarding their products is critical to product quality, improvement and customer satisfaction.</a:t>
-            </a:r>
-            <a:endParaRPr lang="en-US"/>
-          </a:p>
-          <a:p>
-            <a:pPr>
-              <a:lnSpc>
-                <a:spcPct val="100000"/>
-              </a:lnSpc>
-            </a:pPr>
-            <a:endParaRPr lang="en-US" sz="1700"/>
-          </a:p>
-        </p:txBody>
-      </p:sp>
-      <p:pic>
-        <p:nvPicPr>
-          <p:cNvPr id="5" name="Picture 4" descr="Fruits and vegetables in bags">
-            <a:extLst>
-              <a:ext uri="{FF2B5EF4-FFF2-40B4-BE49-F238E27FC236}">
-                <a16:creationId xmlns:a16="http://schemas.microsoft.com/office/drawing/2014/main" id="{A3CC0A9C-35BB-821A-9805-BB6D8E2237CF}"/>
-              </a:ext>
-            </a:extLst>
-          </p:cNvPr>
-          <p:cNvPicPr>
-            <a:picLocks noChangeAspect="1"/>
-          </p:cNvPicPr>
-          <p:nvPr/>
-        </p:nvPicPr>
-        <p:blipFill>
-          <a:blip r:embed="rId2"/>
-          <a:srcRect l="35851" r="7976" b="-2"/>
-          <a:stretch/>
-        </p:blipFill>
-        <p:spPr>
-          <a:xfrm>
-            <a:off x="6420752" y="-1"/>
-            <a:ext cx="5771248" cy="6857999"/>
-          </a:xfrm>
-          <a:prstGeom prst="rect">
+          <a:prstGeom prst="line">
             <a:avLst/>
           </a:prstGeom>
+          <a:ln w="12700">
+            <a:solidFill>
+              <a:schemeClr val="tx1"/>
+            </a:solidFill>
+          </a:ln>
         </p:spPr>
-      </p:pic>
+        <p:style>
+          <a:lnRef idx="1">
+            <a:schemeClr val="accent1"/>
+          </a:lnRef>
+          <a:fillRef idx="0">
+            <a:schemeClr val="accent1"/>
+          </a:fillRef>
+          <a:effectRef idx="0">
+            <a:schemeClr val="accent1"/>
+          </a:effectRef>
+          <a:fontRef idx="minor">
+            <a:schemeClr val="tx1"/>
+          </a:fontRef>
+        </p:style>
+      </p:cxnSp>
+      <p:graphicFrame>
+        <p:nvGraphicFramePr>
+          <p:cNvPr id="6" name="Content Placeholder 2">
+            <a:extLst>
+              <a:ext uri="{FF2B5EF4-FFF2-40B4-BE49-F238E27FC236}">
+                <a16:creationId xmlns:a16="http://schemas.microsoft.com/office/drawing/2014/main" id="{372CC5D4-A8EE-12D0-0718-083495ACAF38}"/>
+              </a:ext>
+            </a:extLst>
+          </p:cNvPr>
+          <p:cNvGraphicFramePr>
+            <a:graphicFrameLocks noGrp="1"/>
+          </p:cNvGraphicFramePr>
+          <p:nvPr>
+            <p:ph idx="1"/>
+            <p:extLst>
+              <p:ext uri="{D42A27DB-BD31-4B8C-83A1-F6EECF244321}">
+                <p14:modId xmlns:p14="http://schemas.microsoft.com/office/powerpoint/2010/main" val="1990463114"/>
+              </p:ext>
+            </p:extLst>
+          </p:nvPr>
+        </p:nvGraphicFramePr>
+        <p:xfrm>
+          <a:off x="700088" y="2222500"/>
+          <a:ext cx="10691812" cy="3740150"/>
+        </p:xfrm>
+        <a:graphic>
+          <a:graphicData uri="http://schemas.openxmlformats.org/drawingml/2006/diagram">
+            <dgm:relIds xmlns:dgm="http://schemas.openxmlformats.org/drawingml/2006/diagram" xmlns:r="http://schemas.openxmlformats.org/officeDocument/2006/relationships" r:dm="rId2" r:lo="rId3" r:qs="rId4" r:cs="rId5"/>
+          </a:graphicData>
+        </a:graphic>
+      </p:graphicFrame>
     </p:spTree>
     <p:extLst>
       <p:ext uri="{BB962C8B-B14F-4D97-AF65-F5344CB8AC3E}">
-        <p14:creationId xmlns:p14="http://schemas.microsoft.com/office/powerpoint/2010/main" val="2003370814"/>
+        <p14:creationId xmlns:p14="http://schemas.microsoft.com/office/powerpoint/2010/main" val="3243244310"/>
       </p:ext>
     </p:extLst>
   </p:cSld>
@@ -10206,7 +10707,7 @@
 </p:sld>
 </file>
 
-<file path=ppt/slides/slide20.xml><?xml version="1.0" encoding="utf-8"?>
+<file path=ppt/slides/slide21.xml><?xml version="1.0" encoding="utf-8"?>
 <p:sld xmlns:a="http://schemas.openxmlformats.org/drawingml/2006/main" xmlns:r="http://schemas.openxmlformats.org/officeDocument/2006/relationships" xmlns:p="http://schemas.openxmlformats.org/presentationml/2006/main">
   <p:cSld>
     <p:bg>
@@ -12533,14 +13034,6 @@
 <file path=ppt/slides/slide8.xml><?xml version="1.0" encoding="utf-8"?>
 <p:sld xmlns:a="http://schemas.openxmlformats.org/drawingml/2006/main" xmlns:r="http://schemas.openxmlformats.org/officeDocument/2006/relationships" xmlns:p="http://schemas.openxmlformats.org/presentationml/2006/main">
   <p:cSld>
-    <p:bg>
-      <p:bgPr>
-        <a:solidFill>
-          <a:schemeClr val="bg1"/>
-        </a:solidFill>
-        <a:effectLst/>
-      </p:bgPr>
-    </p:bg>
     <p:spTree>
       <p:nvGrpSpPr>
         <p:cNvPr id="1" name=""/>
@@ -12555,441 +13048,208 @@
           <a:chExt cx="0" cy="0"/>
         </a:xfrm>
       </p:grpSpPr>
-      <p:sp useBgFill="1">
+      <p:sp>
         <p:nvSpPr>
-          <p:cNvPr id="13" name="Rectangle 12">
-            <a:extLst>
-              <a:ext uri="{FF2B5EF4-FFF2-40B4-BE49-F238E27FC236}">
-                <a16:creationId xmlns:a16="http://schemas.microsoft.com/office/drawing/2014/main" id="{E49D7415-2F11-44C2-B6AA-13A25B6814B9}"/>
-              </a:ext>
-              <a:ext uri="{C183D7F6-B498-43B3-948B-1728B52AA6E4}">
-                <adec:decorative xmlns:adec="http://schemas.microsoft.com/office/drawing/2017/decorative" xmlns="" val="1"/>
-              </a:ext>
-            </a:extLst>
-          </p:cNvPr>
+          <p:cNvPr id="2" name="Title 1"/>
           <p:cNvSpPr>
-            <a:spLocks noGrp="1" noRot="1" noChangeAspect="1" noMove="1" noResize="1" noEditPoints="1" noAdjustHandles="1" noChangeArrowheads="1" noChangeShapeType="1" noTextEdit="1"/>
+            <a:spLocks noGrp="1"/>
           </p:cNvSpPr>
           <p:nvPr>
-            <p:extLst>
-              <p:ext uri="{386F3935-93C4-4BCD-93E2-E3B085C9AB24}">
-                <p16:designElem xmlns:p16="http://schemas.microsoft.com/office/powerpoint/2015/main" val="1"/>
-              </p:ext>
-            </p:extLst>
+            <p:ph type="title"/>
           </p:nvPr>
         </p:nvSpPr>
+        <p:spPr/>
+        <p:txBody>
+          <a:bodyPr/>
+          <a:lstStyle/>
+          <a:p>
+            <a:r>
+              <a:rPr lang="en-US" dirty="0" smtClean="0"/>
+              <a:t>Distribution of scores</a:t>
+            </a:r>
+            <a:endParaRPr lang="en-US" dirty="0"/>
+          </a:p>
+        </p:txBody>
+      </p:sp>
+      <p:pic>
+        <p:nvPicPr>
+          <p:cNvPr id="4" name="Content Placeholder 3"/>
+          <p:cNvPicPr>
+            <a:picLocks noGrp="1" noChangeAspect="1"/>
+          </p:cNvPicPr>
+          <p:nvPr>
+            <p:ph idx="1"/>
+          </p:nvPr>
+        </p:nvPicPr>
+        <p:blipFill>
+          <a:blip r:embed="rId2"/>
+          <a:stretch>
+            <a:fillRect/>
+          </a:stretch>
+        </p:blipFill>
         <p:spPr>
           <a:xfrm>
-            <a:off x="0" y="0"/>
-            <a:ext cx="12192000" cy="6858000"/>
+            <a:off x="6754306" y="2221992"/>
+            <a:ext cx="5021497" cy="3740150"/>
           </a:xfrm>
           <a:prstGeom prst="rect">
             <a:avLst/>
           </a:prstGeom>
-          <a:ln w="12700" cap="flat" cmpd="sng" algn="ctr">
-            <a:noFill/>
-            <a:prstDash val="solid"/>
-            <a:miter lim="800000"/>
-          </a:ln>
-          <a:effectLst/>
-          <a:extLst>
-            <a:ext uri="{91240B29-F687-4F45-9708-019B960494DF}">
-              <a14:hiddenLine xmlns:a14="http://schemas.microsoft.com/office/drawing/2010/main" w="12700" cap="flat" cmpd="sng" algn="ctr">
-                <a:solidFill>
-                  <a:schemeClr val="accent1">
-                    <a:shade val="50000"/>
-                  </a:schemeClr>
-                </a:solidFill>
-                <a:prstDash val="solid"/>
-                <a:miter lim="800000"/>
-              </a14:hiddenLine>
-            </a:ext>
-          </a:extLst>
         </p:spPr>
-        <p:style>
-          <a:lnRef idx="2">
-            <a:schemeClr val="accent1">
-              <a:shade val="50000"/>
-            </a:schemeClr>
-          </a:lnRef>
-          <a:fillRef idx="1">
-            <a:schemeClr val="accent1"/>
-          </a:fillRef>
-          <a:effectRef idx="0">
-            <a:schemeClr val="accent1"/>
-          </a:effectRef>
-          <a:fontRef idx="minor">
-            <a:schemeClr val="lt1"/>
-          </a:fontRef>
-        </p:style>
+      </p:pic>
+      <p:sp>
+        <p:nvSpPr>
+          <p:cNvPr id="5" name="TextBox 4"/>
+          <p:cNvSpPr txBox="1"/>
+          <p:nvPr/>
+        </p:nvSpPr>
+        <p:spPr>
+          <a:xfrm>
+            <a:off x="923731" y="1866122"/>
+            <a:ext cx="5281126" cy="3416320"/>
+          </a:xfrm>
+          <a:prstGeom prst="rect">
+            <a:avLst/>
+          </a:prstGeom>
+          <a:noFill/>
+        </p:spPr>
         <p:txBody>
-          <a:bodyPr rtlCol="0" anchor="ctr"/>
+          <a:bodyPr wrap="square" rtlCol="0">
+            <a:spAutoFit/>
+          </a:bodyPr>
           <a:lstStyle/>
           <a:p>
-            <a:pPr algn="ctr"/>
-            <a:endParaRPr lang="en-US"/>
+            <a:r>
+              <a:rPr lang="en-US" dirty="0" smtClean="0"/>
+              <a:t>From the slide, we can tell that the food has received mostly good reviews (4stars and above), which would mean that the service is more than meeting expectations. </a:t>
+            </a:r>
+          </a:p>
+          <a:p>
+            <a:r>
+              <a:rPr lang="en-US" dirty="0" smtClean="0"/>
+              <a:t>However, due to different tastes and preferences, and lapses in service delivery, we have few poor ratings.</a:t>
+            </a:r>
+          </a:p>
+          <a:p>
+            <a:endParaRPr lang="en-US" dirty="0"/>
+          </a:p>
+          <a:p>
+            <a:r>
+              <a:rPr lang="en-US" dirty="0" smtClean="0"/>
+              <a:t>The models we are working with will lump the ratings into sentiments as follows;</a:t>
+            </a:r>
+          </a:p>
+          <a:p>
+            <a:pPr marL="342900" indent="-342900">
+              <a:buFont typeface="+mj-lt"/>
+              <a:buAutoNum type="arabicPeriod"/>
+            </a:pPr>
+            <a:r>
+              <a:rPr lang="en-US" dirty="0" smtClean="0"/>
+              <a:t>Positive – 4,5</a:t>
+            </a:r>
+          </a:p>
+          <a:p>
+            <a:pPr marL="342900" indent="-342900">
+              <a:buFont typeface="+mj-lt"/>
+              <a:buAutoNum type="arabicPeriod"/>
+            </a:pPr>
+            <a:r>
+              <a:rPr lang="en-US" dirty="0" smtClean="0"/>
+              <a:t>Neutral – 3 </a:t>
+            </a:r>
+          </a:p>
+          <a:p>
+            <a:pPr marL="342900" indent="-342900">
+              <a:buFont typeface="+mj-lt"/>
+              <a:buAutoNum type="arabicPeriod"/>
+            </a:pPr>
+            <a:r>
+              <a:rPr lang="en-US" dirty="0" smtClean="0"/>
+              <a:t>Negative – 1,2</a:t>
+            </a:r>
+            <a:endParaRPr lang="en-US" dirty="0"/>
+          </a:p>
+        </p:txBody>
+      </p:sp>
+    </p:spTree>
+    <p:extLst>
+      <p:ext uri="{BB962C8B-B14F-4D97-AF65-F5344CB8AC3E}">
+        <p14:creationId xmlns:p14="http://schemas.microsoft.com/office/powerpoint/2010/main" val="2325522208"/>
+      </p:ext>
+    </p:extLst>
+  </p:cSld>
+  <p:clrMapOvr>
+    <a:masterClrMapping/>
+  </p:clrMapOvr>
+</p:sld>
+</file>
+
+<file path=ppt/slides/slide9.xml><?xml version="1.0" encoding="utf-8"?>
+<p:sld xmlns:a="http://schemas.openxmlformats.org/drawingml/2006/main" xmlns:r="http://schemas.openxmlformats.org/officeDocument/2006/relationships" xmlns:p="http://schemas.openxmlformats.org/presentationml/2006/main">
+  <p:cSld>
+    <p:spTree>
+      <p:nvGrpSpPr>
+        <p:cNvPr id="1" name=""/>
+        <p:cNvGrpSpPr/>
+        <p:nvPr/>
+      </p:nvGrpSpPr>
+      <p:grpSpPr>
+        <a:xfrm>
+          <a:off x="0" y="0"/>
+          <a:ext cx="0" cy="0"/>
+          <a:chOff x="0" y="0"/>
+          <a:chExt cx="0" cy="0"/>
+        </a:xfrm>
+      </p:grpSpPr>
+      <p:sp>
+        <p:nvSpPr>
+          <p:cNvPr id="2" name="Title 1"/>
+          <p:cNvSpPr>
+            <a:spLocks noGrp="1"/>
+          </p:cNvSpPr>
+          <p:nvPr>
+            <p:ph type="title"/>
+          </p:nvPr>
+        </p:nvSpPr>
+        <p:spPr/>
+        <p:txBody>
+          <a:bodyPr/>
+          <a:lstStyle/>
+          <a:p>
+            <a:r>
+              <a:rPr lang="en-US" dirty="0" smtClean="0"/>
+              <a:t>Distribution of sentiments</a:t>
+            </a:r>
+            <a:endParaRPr lang="en-US" dirty="0"/>
           </a:p>
         </p:txBody>
       </p:sp>
       <p:sp>
         <p:nvSpPr>
-          <p:cNvPr id="2" name="Title 1">
-            <a:extLst>
-              <a:ext uri="{FF2B5EF4-FFF2-40B4-BE49-F238E27FC236}">
-                <a16:creationId xmlns:a16="http://schemas.microsoft.com/office/drawing/2014/main" id="{AAB87A54-5366-E4D4-CAFF-4C7FE83BE59E}"/>
-              </a:ext>
-            </a:extLst>
-          </p:cNvPr>
+          <p:cNvPr id="3" name="Content Placeholder 2"/>
           <p:cNvSpPr>
             <a:spLocks noGrp="1"/>
           </p:cNvSpPr>
           <p:nvPr>
-            <p:ph type="title"/>
+            <p:ph idx="1"/>
           </p:nvPr>
         </p:nvSpPr>
         <p:spPr>
           <a:xfrm>
-            <a:off x="704088" y="914400"/>
-            <a:ext cx="5195889" cy="1316736"/>
+            <a:off x="700636" y="2221992"/>
+            <a:ext cx="4655136" cy="3739896"/>
           </a:xfrm>
         </p:spPr>
         <p:txBody>
-          <a:bodyPr>
-            <a:normAutofit/>
-          </a:bodyPr>
+          <a:bodyPr/>
           <a:lstStyle/>
           <a:p>
             <a:r>
-              <a:rPr lang="en-US"/>
-              <a:t>Model Evaluation</a:t>
-            </a:r>
-          </a:p>
-        </p:txBody>
-      </p:sp>
-      <p:cxnSp>
-        <p:nvCxnSpPr>
-          <p:cNvPr id="14" name="Straight Connector 13">
-            <a:extLst>
-              <a:ext uri="{FF2B5EF4-FFF2-40B4-BE49-F238E27FC236}">
-                <a16:creationId xmlns:a16="http://schemas.microsoft.com/office/drawing/2014/main" id="{F2B951FD-94F7-E138-3EC2-A66A551D9137}"/>
-              </a:ext>
-              <a:ext uri="{C183D7F6-B498-43B3-948B-1728B52AA6E4}">
-                <adec:decorative xmlns:adec="http://schemas.microsoft.com/office/drawing/2017/decorative" xmlns="" val="1"/>
-              </a:ext>
-            </a:extLst>
-          </p:cNvPr>
-          <p:cNvCxnSpPr>
-            <a:cxnSpLocks noGrp="1" noRot="1" noChangeAspect="1" noMove="1" noResize="1" noEditPoints="1" noAdjustHandles="1" noChangeArrowheads="1" noChangeShapeType="1"/>
-          </p:cNvCxnSpPr>
-          <p:nvPr>
-            <p:extLst>
-              <p:ext uri="{386F3935-93C4-4BCD-93E2-E3B085C9AB24}">
-                <p16:designElem xmlns:p16="http://schemas.microsoft.com/office/powerpoint/2015/main" val="1"/>
-              </p:ext>
-            </p:extLst>
-          </p:nvPr>
-        </p:nvCxnSpPr>
-        <p:spPr>
-          <a:xfrm>
-            <a:off x="804672" y="722376"/>
-            <a:ext cx="1638300" cy="0"/>
-          </a:xfrm>
-          <a:prstGeom prst="line">
-            <a:avLst/>
-          </a:prstGeom>
-          <a:ln w="44450">
-            <a:solidFill>
-              <a:schemeClr val="tx1"/>
-            </a:solidFill>
-          </a:ln>
-        </p:spPr>
-        <p:style>
-          <a:lnRef idx="1">
-            <a:schemeClr val="accent1"/>
-          </a:lnRef>
-          <a:fillRef idx="0">
-            <a:schemeClr val="accent1"/>
-          </a:fillRef>
-          <a:effectRef idx="0">
-            <a:schemeClr val="accent1"/>
-          </a:effectRef>
-          <a:fontRef idx="minor">
-            <a:schemeClr val="tx1"/>
-          </a:fontRef>
-        </p:style>
-      </p:cxnSp>
-      <p:sp>
-        <p:nvSpPr>
-          <p:cNvPr id="3" name="Content Placeholder 2">
-            <a:extLst>
-              <a:ext uri="{FF2B5EF4-FFF2-40B4-BE49-F238E27FC236}">
-                <a16:creationId xmlns:a16="http://schemas.microsoft.com/office/drawing/2014/main" id="{B5A594D9-A825-78AA-E548-A860A7C60FF0}"/>
-              </a:ext>
-            </a:extLst>
-          </p:cNvPr>
-          <p:cNvSpPr>
-            <a:spLocks noGrp="1"/>
-          </p:cNvSpPr>
-          <p:nvPr>
-            <p:ph idx="1"/>
-          </p:nvPr>
-        </p:nvSpPr>
-        <p:spPr>
-          <a:xfrm>
-            <a:off x="704088" y="2231136"/>
-            <a:ext cx="5195889" cy="3931920"/>
-          </a:xfrm>
-        </p:spPr>
-        <p:txBody>
-          <a:bodyPr vert="horz" lIns="91440" tIns="45720" rIns="91440" bIns="45720" rtlCol="0" anchor="t">
-            <a:normAutofit/>
-          </a:bodyPr>
-          <a:lstStyle/>
-          <a:p>
-            <a:pPr marL="0" indent="0">
-              <a:lnSpc>
-                <a:spcPct val="100000"/>
-              </a:lnSpc>
-              <a:buNone/>
-            </a:pPr>
-            <a:r>
-              <a:rPr lang="en-US" sz="1600" dirty="0">
-                <a:latin typeface="Cambria"/>
-                <a:cs typeface="Helvetica"/>
-              </a:rPr>
-              <a:t/>
-            </a:r>
-            <a:br>
-              <a:rPr lang="en-US" sz="1600" dirty="0">
-                <a:latin typeface="Cambria"/>
-                <a:cs typeface="Helvetica"/>
-              </a:rPr>
-            </a:br>
-            <a:r>
-              <a:rPr lang="en-US" sz="1600" dirty="0" smtClean="0">
-                <a:latin typeface="Cambria"/>
-                <a:cs typeface="Helvetica"/>
-              </a:rPr>
-              <a:t>We used the following models to </a:t>
-            </a:r>
-            <a:r>
-              <a:rPr lang="en-US" sz="1600" dirty="0" err="1" smtClean="0">
-                <a:latin typeface="Cambria"/>
-                <a:cs typeface="Helvetica"/>
-              </a:rPr>
-              <a:t>analyse</a:t>
-            </a:r>
-            <a:r>
-              <a:rPr lang="en-US" sz="1600" dirty="0" smtClean="0">
-                <a:latin typeface="Cambria"/>
-                <a:cs typeface="Helvetica"/>
-              </a:rPr>
-              <a:t> the data and have ranked them b</a:t>
-            </a:r>
-            <a:r>
-              <a:rPr lang="en-US" sz="1600" dirty="0" smtClean="0">
-                <a:latin typeface="Cambria"/>
-                <a:ea typeface="Cambria"/>
-                <a:cs typeface="Helvetica"/>
-              </a:rPr>
-              <a:t>ased </a:t>
-            </a:r>
-            <a:r>
-              <a:rPr lang="en-US" sz="1600" dirty="0">
-                <a:latin typeface="Cambria"/>
-                <a:ea typeface="Cambria"/>
-                <a:cs typeface="Helvetica"/>
-              </a:rPr>
-              <a:t>on accuracy of each model, below is the ranking of each model:</a:t>
-            </a:r>
-            <a:r>
-              <a:rPr lang="en-US" sz="1600" dirty="0">
-                <a:latin typeface="Cambria"/>
-                <a:cs typeface="Helvetica"/>
-              </a:rPr>
-              <a:t/>
-            </a:r>
-            <a:br>
-              <a:rPr lang="en-US" sz="1600" dirty="0">
-                <a:latin typeface="Cambria"/>
-                <a:cs typeface="Helvetica"/>
-              </a:rPr>
-            </a:br>
-            <a:r>
-              <a:rPr lang="en-US" sz="1600" dirty="0">
-                <a:latin typeface="Cambria"/>
-                <a:ea typeface="Cambria"/>
-                <a:cs typeface="Helvetica"/>
-              </a:rPr>
-              <a:t> </a:t>
-            </a:r>
-            <a:r>
-              <a:rPr lang="en-US" sz="1600" dirty="0">
-                <a:latin typeface="Cambria"/>
-                <a:cs typeface="Helvetica"/>
-              </a:rPr>
-              <a:t/>
-            </a:r>
-            <a:br>
-              <a:rPr lang="en-US" sz="1600" dirty="0">
-                <a:latin typeface="Cambria"/>
-                <a:cs typeface="Helvetica"/>
-              </a:rPr>
-            </a:br>
-            <a:r>
-              <a:rPr lang="en-US" sz="1600" dirty="0">
-                <a:latin typeface="Cambria"/>
-                <a:ea typeface="Cambria"/>
-                <a:cs typeface="Helvetica"/>
-              </a:rPr>
-              <a:t>1. </a:t>
-            </a:r>
-            <a:r>
-              <a:rPr lang="en-US" sz="1600" dirty="0" err="1">
-                <a:latin typeface="Cambria"/>
-                <a:ea typeface="Cambria"/>
-                <a:cs typeface="Helvetica"/>
-              </a:rPr>
-              <a:t>DistilBert</a:t>
-            </a:r>
-            <a:r>
-              <a:rPr lang="en-US" sz="1600" dirty="0">
-                <a:latin typeface="Cambria"/>
-                <a:ea typeface="Cambria"/>
-                <a:cs typeface="Helvetica"/>
-              </a:rPr>
-              <a:t> Model - 85%</a:t>
-            </a:r>
-            <a:r>
-              <a:rPr lang="en-US" sz="1600" dirty="0">
-                <a:latin typeface="Cambria"/>
-                <a:cs typeface="Helvetica"/>
-              </a:rPr>
-              <a:t/>
-            </a:r>
-            <a:br>
-              <a:rPr lang="en-US" sz="1600" dirty="0">
-                <a:latin typeface="Cambria"/>
-                <a:cs typeface="Helvetica"/>
-              </a:rPr>
-            </a:br>
-            <a:r>
-              <a:rPr lang="en-US" sz="1600" dirty="0">
-                <a:latin typeface="Cambria"/>
-                <a:ea typeface="Cambria"/>
-                <a:cs typeface="Helvetica"/>
-              </a:rPr>
-              <a:t> 2. Logistic Regression- 79%</a:t>
-            </a:r>
-            <a:r>
-              <a:rPr lang="en-US" sz="1600" dirty="0">
-                <a:latin typeface="Cambria"/>
-                <a:cs typeface="Helvetica"/>
-              </a:rPr>
-              <a:t/>
-            </a:r>
-            <a:br>
-              <a:rPr lang="en-US" sz="1600" dirty="0">
-                <a:latin typeface="Cambria"/>
-                <a:cs typeface="Helvetica"/>
-              </a:rPr>
-            </a:br>
-            <a:r>
-              <a:rPr lang="en-US" sz="1600" dirty="0">
-                <a:latin typeface="Cambria"/>
-                <a:ea typeface="Cambria"/>
-                <a:cs typeface="Helvetica"/>
-              </a:rPr>
-              <a:t> 3. XG Boost - 79%</a:t>
-            </a:r>
-            <a:r>
-              <a:rPr lang="en-US" sz="1600" dirty="0">
-                <a:latin typeface="Cambria"/>
-                <a:cs typeface="Helvetica"/>
-              </a:rPr>
-              <a:t/>
-            </a:r>
-            <a:br>
-              <a:rPr lang="en-US" sz="1600" dirty="0">
-                <a:latin typeface="Cambria"/>
-                <a:cs typeface="Helvetica"/>
-              </a:rPr>
-            </a:br>
-            <a:r>
-              <a:rPr lang="en-US" sz="1600" dirty="0">
-                <a:latin typeface="Cambria"/>
-                <a:ea typeface="Cambria"/>
-                <a:cs typeface="Helvetica"/>
-              </a:rPr>
-              <a:t> 4. Text CNN - 78%</a:t>
-            </a:r>
-            <a:r>
-              <a:rPr lang="en-US" sz="1600" dirty="0">
-                <a:latin typeface="Cambria"/>
-                <a:cs typeface="Helvetica"/>
-              </a:rPr>
-              <a:t/>
-            </a:r>
-            <a:br>
-              <a:rPr lang="en-US" sz="1600" dirty="0">
-                <a:latin typeface="Cambria"/>
-                <a:cs typeface="Helvetica"/>
-              </a:rPr>
-            </a:br>
-            <a:r>
-              <a:rPr lang="en-US" sz="1600" dirty="0">
-                <a:latin typeface="Cambria"/>
-                <a:ea typeface="Cambria"/>
-                <a:cs typeface="Helvetica"/>
-              </a:rPr>
-              <a:t> 5. Naive Bayes - 77%</a:t>
-            </a:r>
-            <a:r>
-              <a:rPr lang="en-US" sz="1600" dirty="0">
-                <a:latin typeface="Cambria"/>
-                <a:cs typeface="Helvetica"/>
-              </a:rPr>
-              <a:t/>
-            </a:r>
-            <a:br>
-              <a:rPr lang="en-US" sz="1600" dirty="0">
-                <a:latin typeface="Cambria"/>
-                <a:cs typeface="Helvetica"/>
-              </a:rPr>
-            </a:br>
-            <a:r>
-              <a:rPr lang="en-US" sz="1600" dirty="0">
-                <a:latin typeface="Cambria"/>
-                <a:ea typeface="Cambria"/>
-                <a:cs typeface="Helvetica"/>
-              </a:rPr>
-              <a:t> 6. Random forest - 76%</a:t>
-            </a:r>
-            <a:r>
-              <a:rPr lang="en-US" sz="1600" dirty="0">
-                <a:latin typeface="Cambria"/>
-                <a:cs typeface="Helvetica"/>
-              </a:rPr>
-              <a:t/>
-            </a:r>
-            <a:br>
-              <a:rPr lang="en-US" sz="1600" dirty="0">
-                <a:latin typeface="Cambria"/>
-                <a:cs typeface="Helvetica"/>
-              </a:rPr>
-            </a:br>
-            <a:r>
-              <a:rPr lang="en-US" sz="1600" dirty="0">
-                <a:latin typeface="Cambria"/>
-                <a:ea typeface="Cambria"/>
-                <a:cs typeface="Helvetica"/>
-              </a:rPr>
-              <a:t> </a:t>
-            </a:r>
-            <a:endParaRPr lang="en-US" sz="1600" dirty="0">
-              <a:latin typeface="Cambria"/>
-              <a:ea typeface="Cambria"/>
-            </a:endParaRPr>
+              <a:rPr lang="en-US" dirty="0" smtClean="0"/>
+              <a:t>As mention previously, we can now see the distribution of sentiments is more on the positive side. We can confidently say more than 70% of customers received the food well and truly enjoyed it and the service thereof.</a:t>
+            </a:r>
+            <a:endParaRPr lang="en-US" dirty="0"/>
           </a:p>
         </p:txBody>
       </p:sp>
@@ -13009,8 +13269,8 @@
         </p:blipFill>
         <p:spPr>
           <a:xfrm>
-            <a:off x="5505060" y="0"/>
-            <a:ext cx="6686940" cy="6858000"/>
+            <a:off x="5867400" y="1735493"/>
+            <a:ext cx="6324599" cy="4460033"/>
           </a:xfrm>
           <a:prstGeom prst="rect">
             <a:avLst/>
@@ -13020,439 +13280,7 @@
     </p:spTree>
     <p:extLst>
       <p:ext uri="{BB962C8B-B14F-4D97-AF65-F5344CB8AC3E}">
-        <p14:creationId xmlns:p14="http://schemas.microsoft.com/office/powerpoint/2010/main" val="2927179923"/>
-      </p:ext>
-    </p:extLst>
-  </p:cSld>
-  <p:clrMapOvr>
-    <a:masterClrMapping/>
-  </p:clrMapOvr>
-</p:sld>
-</file>
-
-<file path=ppt/slides/slide9.xml><?xml version="1.0" encoding="utf-8"?>
-<p:sld xmlns:a="http://schemas.openxmlformats.org/drawingml/2006/main" xmlns:r="http://schemas.openxmlformats.org/officeDocument/2006/relationships" xmlns:p="http://schemas.openxmlformats.org/presentationml/2006/main">
-  <p:cSld>
-    <p:bg>
-      <p:bgPr>
-        <a:solidFill>
-          <a:schemeClr val="bg1"/>
-        </a:solidFill>
-        <a:effectLst/>
-      </p:bgPr>
-    </p:bg>
-    <p:spTree>
-      <p:nvGrpSpPr>
-        <p:cNvPr id="1" name=""/>
-        <p:cNvGrpSpPr/>
-        <p:nvPr/>
-      </p:nvGrpSpPr>
-      <p:grpSpPr>
-        <a:xfrm>
-          <a:off x="0" y="0"/>
-          <a:ext cx="0" cy="0"/>
-          <a:chOff x="0" y="0"/>
-          <a:chExt cx="0" cy="0"/>
-        </a:xfrm>
-      </p:grpSpPr>
-      <p:sp useBgFill="1">
-        <p:nvSpPr>
-          <p:cNvPr id="9" name="Rectangle 8">
-            <a:extLst>
-              <a:ext uri="{FF2B5EF4-FFF2-40B4-BE49-F238E27FC236}">
-                <a16:creationId xmlns:a16="http://schemas.microsoft.com/office/drawing/2014/main" id="{E49D7415-2F11-44C2-B6AA-13A25B6814B9}"/>
-              </a:ext>
-              <a:ext uri="{C183D7F6-B498-43B3-948B-1728B52AA6E4}">
-                <adec:decorative xmlns:adec="http://schemas.microsoft.com/office/drawing/2017/decorative" xmlns="" val="1"/>
-              </a:ext>
-            </a:extLst>
-          </p:cNvPr>
-          <p:cNvSpPr>
-            <a:spLocks noGrp="1" noRot="1" noChangeAspect="1" noMove="1" noResize="1" noEditPoints="1" noAdjustHandles="1" noChangeArrowheads="1" noChangeShapeType="1" noTextEdit="1"/>
-          </p:cNvSpPr>
-          <p:nvPr>
-            <p:extLst>
-              <p:ext uri="{386F3935-93C4-4BCD-93E2-E3B085C9AB24}">
-                <p16:designElem xmlns:p16="http://schemas.microsoft.com/office/powerpoint/2015/main" val="1"/>
-              </p:ext>
-            </p:extLst>
-          </p:nvPr>
-        </p:nvSpPr>
-        <p:spPr>
-          <a:xfrm>
-            <a:off x="0" y="0"/>
-            <a:ext cx="12192000" cy="6858000"/>
-          </a:xfrm>
-          <a:prstGeom prst="rect">
-            <a:avLst/>
-          </a:prstGeom>
-          <a:ln w="12700" cap="flat" cmpd="sng" algn="ctr">
-            <a:noFill/>
-            <a:prstDash val="solid"/>
-            <a:miter lim="800000"/>
-          </a:ln>
-          <a:effectLst/>
-          <a:extLst>
-            <a:ext uri="{91240B29-F687-4F45-9708-019B960494DF}">
-              <a14:hiddenLine xmlns:a14="http://schemas.microsoft.com/office/drawing/2010/main" w="12700" cap="flat" cmpd="sng" algn="ctr">
-                <a:solidFill>
-                  <a:schemeClr val="accent1">
-                    <a:shade val="50000"/>
-                  </a:schemeClr>
-                </a:solidFill>
-                <a:prstDash val="solid"/>
-                <a:miter lim="800000"/>
-              </a14:hiddenLine>
-            </a:ext>
-          </a:extLst>
-        </p:spPr>
-        <p:style>
-          <a:lnRef idx="2">
-            <a:schemeClr val="accent1">
-              <a:shade val="50000"/>
-            </a:schemeClr>
-          </a:lnRef>
-          <a:fillRef idx="1">
-            <a:schemeClr val="accent1"/>
-          </a:fillRef>
-          <a:effectRef idx="0">
-            <a:schemeClr val="accent1"/>
-          </a:effectRef>
-          <a:fontRef idx="minor">
-            <a:schemeClr val="lt1"/>
-          </a:fontRef>
-        </p:style>
-        <p:txBody>
-          <a:bodyPr rtlCol="0" anchor="ctr"/>
-          <a:lstStyle/>
-          <a:p>
-            <a:pPr algn="ctr"/>
-            <a:endParaRPr lang="en-US"/>
-          </a:p>
-        </p:txBody>
-      </p:sp>
-      <p:sp>
-        <p:nvSpPr>
-          <p:cNvPr id="2" name="Title 1">
-            <a:extLst>
-              <a:ext uri="{FF2B5EF4-FFF2-40B4-BE49-F238E27FC236}">
-                <a16:creationId xmlns:a16="http://schemas.microsoft.com/office/drawing/2014/main" id="{78766172-F6EA-3473-E2D1-81D112D7614C}"/>
-              </a:ext>
-            </a:extLst>
-          </p:cNvPr>
-          <p:cNvSpPr>
-            <a:spLocks noGrp="1"/>
-          </p:cNvSpPr>
-          <p:nvPr>
-            <p:ph type="title"/>
-          </p:nvPr>
-        </p:nvSpPr>
-        <p:spPr>
-          <a:xfrm>
-            <a:off x="5248656" y="914400"/>
-            <a:ext cx="6236208" cy="1307592"/>
-          </a:xfrm>
-        </p:spPr>
-        <p:txBody>
-          <a:bodyPr>
-            <a:normAutofit fontScale="90000"/>
-          </a:bodyPr>
-          <a:lstStyle/>
-          <a:p>
-            <a:r>
-              <a:rPr lang="en-US"/>
-              <a:t>Hyperparameter tuning</a:t>
-            </a:r>
-          </a:p>
-        </p:txBody>
-      </p:sp>
-      <p:pic>
-        <p:nvPicPr>
-          <p:cNvPr id="5" name="Picture 4" descr="White stopwatch">
-            <a:extLst>
-              <a:ext uri="{FF2B5EF4-FFF2-40B4-BE49-F238E27FC236}">
-                <a16:creationId xmlns:a16="http://schemas.microsoft.com/office/drawing/2014/main" id="{B29E788A-6D8E-6658-E458-B5EFAD002175}"/>
-              </a:ext>
-            </a:extLst>
-          </p:cNvPr>
-          <p:cNvPicPr>
-            <a:picLocks noChangeAspect="1"/>
-          </p:cNvPicPr>
-          <p:nvPr/>
-        </p:nvPicPr>
-        <p:blipFill>
-          <a:blip r:embed="rId2"/>
-          <a:srcRect l="54680" r="-4" b="-4"/>
-          <a:stretch/>
-        </p:blipFill>
-        <p:spPr>
-          <a:xfrm>
-            <a:off x="20" y="-1"/>
-            <a:ext cx="4663420" cy="6858001"/>
-          </a:xfrm>
-          <a:prstGeom prst="rect">
-            <a:avLst/>
-          </a:prstGeom>
-        </p:spPr>
-      </p:pic>
-      <p:cxnSp>
-        <p:nvCxnSpPr>
-          <p:cNvPr id="11" name="Straight Connector 10">
-            <a:extLst>
-              <a:ext uri="{FF2B5EF4-FFF2-40B4-BE49-F238E27FC236}">
-                <a16:creationId xmlns:a16="http://schemas.microsoft.com/office/drawing/2014/main" id="{D2E57F3D-33BE-4306-87E6-245763719516}"/>
-              </a:ext>
-              <a:ext uri="{C183D7F6-B498-43B3-948B-1728B52AA6E4}">
-                <adec:decorative xmlns:adec="http://schemas.microsoft.com/office/drawing/2017/decorative" xmlns="" val="1"/>
-              </a:ext>
-            </a:extLst>
-          </p:cNvPr>
-          <p:cNvCxnSpPr>
-            <a:cxnSpLocks noGrp="1" noRot="1" noChangeAspect="1" noMove="1" noResize="1" noEditPoints="1" noAdjustHandles="1" noChangeArrowheads="1" noChangeShapeType="1"/>
-          </p:cNvCxnSpPr>
-          <p:nvPr>
-            <p:extLst>
-              <p:ext uri="{386F3935-93C4-4BCD-93E2-E3B085C9AB24}">
-                <p16:designElem xmlns:p16="http://schemas.microsoft.com/office/powerpoint/2015/main" val="1"/>
-              </p:ext>
-            </p:extLst>
-          </p:nvPr>
-        </p:nvCxnSpPr>
-        <p:spPr>
-          <a:xfrm>
-            <a:off x="5346871" y="722376"/>
-            <a:ext cx="1638300" cy="0"/>
-          </a:xfrm>
-          <a:prstGeom prst="line">
-            <a:avLst/>
-          </a:prstGeom>
-          <a:ln w="44450">
-            <a:solidFill>
-              <a:schemeClr val="tx1"/>
-            </a:solidFill>
-          </a:ln>
-        </p:spPr>
-        <p:style>
-          <a:lnRef idx="1">
-            <a:schemeClr val="accent1"/>
-          </a:lnRef>
-          <a:fillRef idx="0">
-            <a:schemeClr val="accent1"/>
-          </a:fillRef>
-          <a:effectRef idx="0">
-            <a:schemeClr val="accent1"/>
-          </a:effectRef>
-          <a:fontRef idx="minor">
-            <a:schemeClr val="tx1"/>
-          </a:fontRef>
-        </p:style>
-      </p:cxnSp>
-      <p:sp>
-        <p:nvSpPr>
-          <p:cNvPr id="3" name="Content Placeholder 2">
-            <a:extLst>
-              <a:ext uri="{FF2B5EF4-FFF2-40B4-BE49-F238E27FC236}">
-                <a16:creationId xmlns:a16="http://schemas.microsoft.com/office/drawing/2014/main" id="{E669E115-D7A7-3091-D21C-D944D9F5CD0F}"/>
-              </a:ext>
-            </a:extLst>
-          </p:cNvPr>
-          <p:cNvSpPr>
-            <a:spLocks noGrp="1"/>
-          </p:cNvSpPr>
-          <p:nvPr>
-            <p:ph idx="1"/>
-          </p:nvPr>
-        </p:nvSpPr>
-        <p:spPr>
-          <a:xfrm>
-            <a:off x="5248656" y="2221992"/>
-            <a:ext cx="6236208" cy="3941064"/>
-          </a:xfrm>
-        </p:spPr>
-        <p:txBody>
-          <a:bodyPr vert="horz" lIns="91440" tIns="45720" rIns="91440" bIns="45720" rtlCol="0">
-            <a:normAutofit/>
-          </a:bodyPr>
-          <a:lstStyle/>
-          <a:p>
-            <a:pPr>
-              <a:lnSpc>
-                <a:spcPct val="100000"/>
-              </a:lnSpc>
-            </a:pPr>
-            <a:endParaRPr lang="en-US" sz="1700">
-              <a:latin typeface="Cambria"/>
-              <a:ea typeface="Cambria"/>
-            </a:endParaRPr>
-          </a:p>
-          <a:p>
-            <a:pPr>
-              <a:lnSpc>
-                <a:spcPct val="100000"/>
-              </a:lnSpc>
-            </a:pPr>
-            <a:r>
-              <a:rPr lang="en-US" sz="1700">
-                <a:latin typeface="Cambria"/>
-                <a:ea typeface="Cambria"/>
-                <a:cs typeface="Helvetica"/>
-              </a:rPr>
-              <a:t>After tuning both the Logistic Regression and </a:t>
-            </a:r>
-            <a:r>
-              <a:rPr lang="en-US" sz="1700" err="1">
-                <a:latin typeface="Cambria"/>
-                <a:ea typeface="Cambria"/>
-                <a:cs typeface="Helvetica"/>
-              </a:rPr>
-              <a:t>TextCNN</a:t>
-            </a:r>
-            <a:r>
-              <a:rPr lang="en-US" sz="1700">
-                <a:latin typeface="Cambria"/>
-                <a:ea typeface="Cambria"/>
-                <a:cs typeface="Helvetica"/>
-              </a:rPr>
-              <a:t> models, we discovered that Logistic Regression remained the top-performing model. </a:t>
-            </a:r>
-          </a:p>
-          <a:p>
-            <a:pPr>
-              <a:lnSpc>
-                <a:spcPct val="100000"/>
-              </a:lnSpc>
-            </a:pPr>
-            <a:r>
-              <a:rPr lang="en-US" sz="1700">
-                <a:latin typeface="Cambria"/>
-                <a:ea typeface="Cambria"/>
-                <a:cs typeface="Helvetica"/>
-              </a:rPr>
-              <a:t>Although the </a:t>
-            </a:r>
-            <a:r>
-              <a:rPr lang="en-US" sz="1700" err="1">
-                <a:latin typeface="Cambria"/>
-                <a:ea typeface="Cambria"/>
-                <a:cs typeface="Helvetica"/>
-              </a:rPr>
-              <a:t>TextCNN</a:t>
-            </a:r>
-            <a:r>
-              <a:rPr lang="en-US" sz="1700">
-                <a:latin typeface="Cambria"/>
-                <a:ea typeface="Cambria"/>
-                <a:cs typeface="Helvetica"/>
-              </a:rPr>
-              <a:t> model performed with small improvements in its metrics, they were not sufficient to surpass those of the tuned Logistic Regression model. </a:t>
-            </a:r>
-          </a:p>
-          <a:p>
-            <a:pPr>
-              <a:lnSpc>
-                <a:spcPct val="100000"/>
-              </a:lnSpc>
-            </a:pPr>
-            <a:r>
-              <a:rPr lang="en-US" sz="1700">
-                <a:latin typeface="Cambria"/>
-                <a:ea typeface="Cambria"/>
-                <a:cs typeface="Helvetica"/>
-              </a:rPr>
-              <a:t>Although at first the </a:t>
-            </a:r>
-            <a:r>
-              <a:rPr lang="en-US" sz="1700" err="1">
-                <a:latin typeface="Cambria"/>
-                <a:ea typeface="Cambria"/>
-                <a:cs typeface="Helvetica"/>
-              </a:rPr>
-              <a:t>DistilBERT</a:t>
-            </a:r>
-            <a:r>
-              <a:rPr lang="en-US" sz="1700">
-                <a:latin typeface="Cambria"/>
-                <a:ea typeface="Cambria"/>
-                <a:cs typeface="Helvetica"/>
-              </a:rPr>
-              <a:t> model performed better than all the other models as far as performance metrics were concerned, we could not tune it </a:t>
-            </a:r>
-            <a:r>
-              <a:rPr lang="en-US" sz="1700" err="1">
-                <a:latin typeface="Cambria"/>
-                <a:ea typeface="Cambria"/>
-                <a:cs typeface="Helvetica"/>
-              </a:rPr>
-              <a:t>since.K</a:t>
-            </a:r>
-            <a:r>
-              <a:rPr lang="en-US" sz="1700">
-                <a:latin typeface="Cambria"/>
-                <a:ea typeface="Cambria"/>
-                <a:cs typeface="Helvetica"/>
-              </a:rPr>
-              <a:t>. we did not have enough computational </a:t>
-            </a:r>
-            <a:r>
-              <a:rPr lang="en-US" sz="1700" err="1">
-                <a:latin typeface="Cambria"/>
-                <a:ea typeface="Cambria"/>
-                <a:cs typeface="Helvetica"/>
-              </a:rPr>
-              <a:t>resources.K</a:t>
-            </a:r>
-            <a:r>
-              <a:rPr lang="en-US" sz="1700">
-                <a:latin typeface="Cambria"/>
-                <a:ea typeface="Cambria"/>
-                <a:cs typeface="Helvetica"/>
-              </a:rPr>
-              <a:t>. Therefore, we couldn't make full use of its classification capability despite its high performance potential.</a:t>
-            </a:r>
-            <a:endParaRPr lang="en-US" sz="1700">
-              <a:latin typeface="Cambria"/>
-              <a:ea typeface="Cambria"/>
-            </a:endParaRPr>
-          </a:p>
-          <a:p>
-            <a:pPr>
-              <a:lnSpc>
-                <a:spcPct val="100000"/>
-              </a:lnSpc>
-            </a:pPr>
-            <a:endParaRPr lang="en-US" sz="1700">
-              <a:latin typeface="Cambria"/>
-              <a:ea typeface="Cambria"/>
-            </a:endParaRPr>
-          </a:p>
-          <a:p>
-            <a:pPr>
-              <a:lnSpc>
-                <a:spcPct val="100000"/>
-              </a:lnSpc>
-            </a:pPr>
-            <a:endParaRPr lang="en-US" sz="1700">
-              <a:latin typeface="Cambria"/>
-              <a:ea typeface="Cambria"/>
-            </a:endParaRPr>
-          </a:p>
-          <a:p>
-            <a:pPr>
-              <a:lnSpc>
-                <a:spcPct val="100000"/>
-              </a:lnSpc>
-            </a:pPr>
-            <a:endParaRPr lang="en-US" sz="1700">
-              <a:latin typeface="Cambria"/>
-              <a:ea typeface="Cambria"/>
-            </a:endParaRPr>
-          </a:p>
-        </p:txBody>
-      </p:sp>
-    </p:spTree>
-    <p:extLst>
-      <p:ext uri="{BB962C8B-B14F-4D97-AF65-F5344CB8AC3E}">
-        <p14:creationId xmlns:p14="http://schemas.microsoft.com/office/powerpoint/2010/main" val="3874220159"/>
+        <p14:creationId xmlns:p14="http://schemas.microsoft.com/office/powerpoint/2010/main" val="2925415450"/>
       </p:ext>
     </p:extLst>
   </p:cSld>

</xml_diff>

<commit_message>
Added some visualizations, feature importance
</commit_message>
<xml_diff>
--- a/GROUP 9 PHASE 4 PROJECT.pptx
+++ b/GROUP 9 PHASE 4 PROJECT.pptx
@@ -15,16 +15,18 @@
     <p:sldId id="277" r:id="rId9"/>
     <p:sldId id="278" r:id="rId10"/>
     <p:sldId id="273" r:id="rId11"/>
-    <p:sldId id="263" r:id="rId12"/>
-    <p:sldId id="264" r:id="rId13"/>
-    <p:sldId id="265" r:id="rId14"/>
-    <p:sldId id="266" r:id="rId15"/>
-    <p:sldId id="267" r:id="rId16"/>
-    <p:sldId id="270" r:id="rId17"/>
-    <p:sldId id="268" r:id="rId18"/>
-    <p:sldId id="271" r:id="rId19"/>
-    <p:sldId id="272" r:id="rId20"/>
-    <p:sldId id="276" r:id="rId21"/>
+    <p:sldId id="280" r:id="rId12"/>
+    <p:sldId id="281" r:id="rId13"/>
+    <p:sldId id="263" r:id="rId14"/>
+    <p:sldId id="264" r:id="rId15"/>
+    <p:sldId id="265" r:id="rId16"/>
+    <p:sldId id="266" r:id="rId17"/>
+    <p:sldId id="267" r:id="rId18"/>
+    <p:sldId id="270" r:id="rId19"/>
+    <p:sldId id="268" r:id="rId20"/>
+    <p:sldId id="271" r:id="rId21"/>
+    <p:sldId id="272" r:id="rId22"/>
+    <p:sldId id="276" r:id="rId23"/>
   </p:sldIdLst>
   <p:sldSz cx="12192000" cy="6858000"/>
   <p:notesSz cx="6858000" cy="9144000"/>
@@ -6484,7 +6486,7 @@
               </a:lnSpc>
             </a:pPr>
             <a:r>
-              <a:rPr lang="en-US" sz="4000">
+              <a:rPr lang="en-US" sz="4000" dirty="0">
                 <a:effectLst/>
                 <a:latin typeface="Cambria" panose="02040503050406030204" pitchFamily="18" charset="0"/>
                 <a:ea typeface="MS Mincho" panose="02020609040205080304" pitchFamily="49" charset="-128"/>
@@ -6493,14 +6495,14 @@
               <a:t>Sentiment Analysis of Amazon Fine Food Reviews</a:t>
             </a:r>
             <a:br>
-              <a:rPr lang="en-US" sz="4000">
+              <a:rPr lang="en-US" sz="4000" dirty="0">
                 <a:effectLst/>
                 <a:latin typeface="Cambria" panose="02040503050406030204" pitchFamily="18" charset="0"/>
                 <a:ea typeface="MS Mincho" panose="02020609040205080304" pitchFamily="49" charset="-128"/>
                 <a:cs typeface="Times New Roman" panose="02020603050405020304" pitchFamily="18" charset="0"/>
               </a:rPr>
             </a:br>
-            <a:endParaRPr lang="en-US" sz="4000"/>
+            <a:endParaRPr lang="en-US" sz="4000" dirty="0"/>
           </a:p>
         </p:txBody>
       </p:sp>
@@ -7297,6 +7299,672 @@
           <a:chExt cx="0" cy="0"/>
         </a:xfrm>
       </p:grpSpPr>
+      <p:sp useBgFill="1">
+        <p:nvSpPr>
+          <p:cNvPr id="13" name="Rectangle 12">
+            <a:extLst>
+              <a:ext uri="{FF2B5EF4-FFF2-40B4-BE49-F238E27FC236}">
+                <a16:creationId xmlns:a16="http://schemas.microsoft.com/office/drawing/2014/main" id="{E49D7415-2F11-44C2-B6AA-13A25B6814B9}"/>
+              </a:ext>
+              <a:ext uri="{C183D7F6-B498-43B3-948B-1728B52AA6E4}">
+                <adec:decorative xmlns:adec="http://schemas.microsoft.com/office/drawing/2017/decorative" xmlns="" val="1"/>
+              </a:ext>
+            </a:extLst>
+          </p:cNvPr>
+          <p:cNvSpPr>
+            <a:spLocks noGrp="1" noRot="1" noChangeAspect="1" noMove="1" noResize="1" noEditPoints="1" noAdjustHandles="1" noChangeArrowheads="1" noChangeShapeType="1" noTextEdit="1"/>
+          </p:cNvSpPr>
+          <p:nvPr>
+            <p:extLst>
+              <p:ext uri="{386F3935-93C4-4BCD-93E2-E3B085C9AB24}">
+                <p16:designElem xmlns:p16="http://schemas.microsoft.com/office/powerpoint/2015/main" val="1"/>
+              </p:ext>
+            </p:extLst>
+          </p:nvPr>
+        </p:nvSpPr>
+        <p:spPr>
+          <a:xfrm>
+            <a:off x="0" y="0"/>
+            <a:ext cx="12192000" cy="6858000"/>
+          </a:xfrm>
+          <a:prstGeom prst="rect">
+            <a:avLst/>
+          </a:prstGeom>
+          <a:ln w="12700" cap="flat" cmpd="sng" algn="ctr">
+            <a:noFill/>
+            <a:prstDash val="solid"/>
+            <a:miter lim="800000"/>
+          </a:ln>
+          <a:effectLst/>
+          <a:extLst>
+            <a:ext uri="{91240B29-F687-4F45-9708-019B960494DF}">
+              <a14:hiddenLine xmlns:a14="http://schemas.microsoft.com/office/drawing/2010/main" w="12700" cap="flat" cmpd="sng" algn="ctr">
+                <a:solidFill>
+                  <a:schemeClr val="accent1">
+                    <a:shade val="50000"/>
+                  </a:schemeClr>
+                </a:solidFill>
+                <a:prstDash val="solid"/>
+                <a:miter lim="800000"/>
+              </a14:hiddenLine>
+            </a:ext>
+          </a:extLst>
+        </p:spPr>
+        <p:style>
+          <a:lnRef idx="2">
+            <a:schemeClr val="accent1">
+              <a:shade val="50000"/>
+            </a:schemeClr>
+          </a:lnRef>
+          <a:fillRef idx="1">
+            <a:schemeClr val="accent1"/>
+          </a:fillRef>
+          <a:effectRef idx="0">
+            <a:schemeClr val="accent1"/>
+          </a:effectRef>
+          <a:fontRef idx="minor">
+            <a:schemeClr val="lt1"/>
+          </a:fontRef>
+        </p:style>
+        <p:txBody>
+          <a:bodyPr rtlCol="0" anchor="ctr"/>
+          <a:lstStyle/>
+          <a:p>
+            <a:pPr algn="ctr"/>
+            <a:endParaRPr lang="en-US"/>
+          </a:p>
+        </p:txBody>
+      </p:sp>
+      <p:sp>
+        <p:nvSpPr>
+          <p:cNvPr id="2" name="Title 1">
+            <a:extLst>
+              <a:ext uri="{FF2B5EF4-FFF2-40B4-BE49-F238E27FC236}">
+                <a16:creationId xmlns:a16="http://schemas.microsoft.com/office/drawing/2014/main" id="{AAB87A54-5366-E4D4-CAFF-4C7FE83BE59E}"/>
+              </a:ext>
+            </a:extLst>
+          </p:cNvPr>
+          <p:cNvSpPr>
+            <a:spLocks noGrp="1"/>
+          </p:cNvSpPr>
+          <p:nvPr>
+            <p:ph type="title"/>
+          </p:nvPr>
+        </p:nvSpPr>
+        <p:spPr>
+          <a:xfrm>
+            <a:off x="704088" y="914400"/>
+            <a:ext cx="5195889" cy="1316736"/>
+          </a:xfrm>
+        </p:spPr>
+        <p:txBody>
+          <a:bodyPr>
+            <a:normAutofit fontScale="90000"/>
+          </a:bodyPr>
+          <a:lstStyle/>
+          <a:p>
+            <a:r>
+              <a:rPr lang="en-US" dirty="0" smtClean="0"/>
+              <a:t>Words that </a:t>
+            </a:r>
+            <a:br>
+              <a:rPr lang="en-US" dirty="0" smtClean="0"/>
+            </a:br>
+            <a:r>
+              <a:rPr lang="en-US" dirty="0" smtClean="0"/>
+              <a:t>guided model performance</a:t>
+            </a:r>
+            <a:endParaRPr lang="en-US" dirty="0"/>
+          </a:p>
+        </p:txBody>
+      </p:sp>
+      <p:cxnSp>
+        <p:nvCxnSpPr>
+          <p:cNvPr id="14" name="Straight Connector 13">
+            <a:extLst>
+              <a:ext uri="{FF2B5EF4-FFF2-40B4-BE49-F238E27FC236}">
+                <a16:creationId xmlns:a16="http://schemas.microsoft.com/office/drawing/2014/main" id="{F2B951FD-94F7-E138-3EC2-A66A551D9137}"/>
+              </a:ext>
+              <a:ext uri="{C183D7F6-B498-43B3-948B-1728B52AA6E4}">
+                <adec:decorative xmlns:adec="http://schemas.microsoft.com/office/drawing/2017/decorative" xmlns="" val="1"/>
+              </a:ext>
+            </a:extLst>
+          </p:cNvPr>
+          <p:cNvCxnSpPr>
+            <a:cxnSpLocks noGrp="1" noRot="1" noChangeAspect="1" noMove="1" noResize="1" noEditPoints="1" noAdjustHandles="1" noChangeArrowheads="1" noChangeShapeType="1"/>
+          </p:cNvCxnSpPr>
+          <p:nvPr>
+            <p:extLst>
+              <p:ext uri="{386F3935-93C4-4BCD-93E2-E3B085C9AB24}">
+                <p16:designElem xmlns:p16="http://schemas.microsoft.com/office/powerpoint/2015/main" val="1"/>
+              </p:ext>
+            </p:extLst>
+          </p:nvPr>
+        </p:nvCxnSpPr>
+        <p:spPr>
+          <a:xfrm>
+            <a:off x="804672" y="722376"/>
+            <a:ext cx="1638300" cy="0"/>
+          </a:xfrm>
+          <a:prstGeom prst="line">
+            <a:avLst/>
+          </a:prstGeom>
+          <a:ln w="44450">
+            <a:solidFill>
+              <a:schemeClr val="tx1"/>
+            </a:solidFill>
+          </a:ln>
+        </p:spPr>
+        <p:style>
+          <a:lnRef idx="1">
+            <a:schemeClr val="accent1"/>
+          </a:lnRef>
+          <a:fillRef idx="0">
+            <a:schemeClr val="accent1"/>
+          </a:fillRef>
+          <a:effectRef idx="0">
+            <a:schemeClr val="accent1"/>
+          </a:effectRef>
+          <a:fontRef idx="minor">
+            <a:schemeClr val="tx1"/>
+          </a:fontRef>
+        </p:style>
+      </p:cxnSp>
+      <p:sp>
+        <p:nvSpPr>
+          <p:cNvPr id="3" name="Content Placeholder 2">
+            <a:extLst>
+              <a:ext uri="{FF2B5EF4-FFF2-40B4-BE49-F238E27FC236}">
+                <a16:creationId xmlns:a16="http://schemas.microsoft.com/office/drawing/2014/main" id="{B5A594D9-A825-78AA-E548-A860A7C60FF0}"/>
+              </a:ext>
+            </a:extLst>
+          </p:cNvPr>
+          <p:cNvSpPr>
+            <a:spLocks noGrp="1"/>
+          </p:cNvSpPr>
+          <p:nvPr>
+            <p:ph idx="1"/>
+          </p:nvPr>
+        </p:nvSpPr>
+        <p:spPr>
+          <a:xfrm>
+            <a:off x="704088" y="2771192"/>
+            <a:ext cx="5195889" cy="3391864"/>
+          </a:xfrm>
+        </p:spPr>
+        <p:txBody>
+          <a:bodyPr vert="horz" lIns="91440" tIns="45720" rIns="91440" bIns="45720" rtlCol="0" anchor="t">
+            <a:normAutofit/>
+          </a:bodyPr>
+          <a:lstStyle/>
+          <a:p>
+            <a:pPr marL="0" indent="0">
+              <a:lnSpc>
+                <a:spcPct val="100000"/>
+              </a:lnSpc>
+              <a:buNone/>
+            </a:pPr>
+            <a:r>
+              <a:rPr lang="en-US" sz="1600" dirty="0">
+                <a:latin typeface="Cambria"/>
+                <a:cs typeface="Helvetica"/>
+              </a:rPr>
+              <a:t/>
+            </a:r>
+            <a:br>
+              <a:rPr lang="en-US" sz="1600" dirty="0">
+                <a:latin typeface="Cambria"/>
+                <a:cs typeface="Helvetica"/>
+              </a:rPr>
+            </a:br>
+            <a:r>
+              <a:rPr lang="en-US" sz="1600" dirty="0" smtClean="0">
+                <a:latin typeface="Cambria"/>
+                <a:cs typeface="Helvetica"/>
+              </a:rPr>
+              <a:t>The words across in the graph here are what helped </a:t>
+            </a:r>
+          </a:p>
+          <a:p>
+            <a:pPr marL="0" indent="0">
+              <a:lnSpc>
+                <a:spcPct val="100000"/>
+              </a:lnSpc>
+              <a:buNone/>
+            </a:pPr>
+            <a:r>
+              <a:rPr lang="en-US" sz="1600" dirty="0" smtClean="0">
+                <a:latin typeface="Cambria"/>
+                <a:cs typeface="Helvetica"/>
+              </a:rPr>
+              <a:t>guide the model and have been ranked by magnitude.</a:t>
+            </a:r>
+          </a:p>
+          <a:p>
+            <a:pPr marL="0" indent="0">
+              <a:lnSpc>
+                <a:spcPct val="100000"/>
+              </a:lnSpc>
+              <a:buNone/>
+            </a:pPr>
+            <a:r>
+              <a:rPr lang="en-US" sz="1600" dirty="0" smtClean="0">
+                <a:latin typeface="Cambria"/>
+                <a:ea typeface="Cambria"/>
+                <a:cs typeface="Helvetica"/>
+              </a:rPr>
+              <a:t>They assisted the Logistic Regression model.</a:t>
+            </a:r>
+            <a:r>
+              <a:rPr lang="en-US" sz="1600" dirty="0" smtClean="0">
+                <a:latin typeface="Cambria"/>
+                <a:ea typeface="Cambria"/>
+                <a:cs typeface="Helvetica"/>
+              </a:rPr>
+              <a:t> </a:t>
+            </a:r>
+            <a:endParaRPr lang="en-US" sz="1600" dirty="0">
+              <a:latin typeface="Cambria"/>
+              <a:ea typeface="Cambria"/>
+            </a:endParaRPr>
+          </a:p>
+        </p:txBody>
+      </p:sp>
+      <p:pic>
+        <p:nvPicPr>
+          <p:cNvPr id="5" name="Picture 4"/>
+          <p:cNvPicPr>
+            <a:picLocks noChangeAspect="1"/>
+          </p:cNvPicPr>
+          <p:nvPr/>
+        </p:nvPicPr>
+        <p:blipFill>
+          <a:blip r:embed="rId2"/>
+          <a:stretch>
+            <a:fillRect/>
+          </a:stretch>
+        </p:blipFill>
+        <p:spPr>
+          <a:xfrm>
+            <a:off x="5738327" y="0"/>
+            <a:ext cx="6453673" cy="6746033"/>
+          </a:xfrm>
+          <a:prstGeom prst="rect">
+            <a:avLst/>
+          </a:prstGeom>
+        </p:spPr>
+      </p:pic>
+    </p:spTree>
+    <p:extLst>
+      <p:ext uri="{BB962C8B-B14F-4D97-AF65-F5344CB8AC3E}">
+        <p14:creationId xmlns:p14="http://schemas.microsoft.com/office/powerpoint/2010/main" val="69728109"/>
+      </p:ext>
+    </p:extLst>
+  </p:cSld>
+  <p:clrMapOvr>
+    <a:masterClrMapping/>
+  </p:clrMapOvr>
+</p:sld>
+</file>
+
+<file path=ppt/slides/slide12.xml><?xml version="1.0" encoding="utf-8"?>
+<p:sld xmlns:a="http://schemas.openxmlformats.org/drawingml/2006/main" xmlns:r="http://schemas.openxmlformats.org/officeDocument/2006/relationships" xmlns:p="http://schemas.openxmlformats.org/presentationml/2006/main">
+  <p:cSld>
+    <p:bg>
+      <p:bgPr>
+        <a:solidFill>
+          <a:schemeClr val="bg1"/>
+        </a:solidFill>
+        <a:effectLst/>
+      </p:bgPr>
+    </p:bg>
+    <p:spTree>
+      <p:nvGrpSpPr>
+        <p:cNvPr id="1" name=""/>
+        <p:cNvGrpSpPr/>
+        <p:nvPr/>
+      </p:nvGrpSpPr>
+      <p:grpSpPr>
+        <a:xfrm>
+          <a:off x="0" y="0"/>
+          <a:ext cx="0" cy="0"/>
+          <a:chOff x="0" y="0"/>
+          <a:chExt cx="0" cy="0"/>
+        </a:xfrm>
+      </p:grpSpPr>
+      <p:sp useBgFill="1">
+        <p:nvSpPr>
+          <p:cNvPr id="13" name="Rectangle 12">
+            <a:extLst>
+              <a:ext uri="{FF2B5EF4-FFF2-40B4-BE49-F238E27FC236}">
+                <a16:creationId xmlns:a16="http://schemas.microsoft.com/office/drawing/2014/main" id="{E49D7415-2F11-44C2-B6AA-13A25B6814B9}"/>
+              </a:ext>
+              <a:ext uri="{C183D7F6-B498-43B3-948B-1728B52AA6E4}">
+                <adec:decorative xmlns:adec="http://schemas.microsoft.com/office/drawing/2017/decorative" xmlns="" val="1"/>
+              </a:ext>
+            </a:extLst>
+          </p:cNvPr>
+          <p:cNvSpPr>
+            <a:spLocks noGrp="1" noRot="1" noChangeAspect="1" noMove="1" noResize="1" noEditPoints="1" noAdjustHandles="1" noChangeArrowheads="1" noChangeShapeType="1" noTextEdit="1"/>
+          </p:cNvSpPr>
+          <p:nvPr>
+            <p:extLst>
+              <p:ext uri="{386F3935-93C4-4BCD-93E2-E3B085C9AB24}">
+                <p16:designElem xmlns:p16="http://schemas.microsoft.com/office/powerpoint/2015/main" val="1"/>
+              </p:ext>
+            </p:extLst>
+          </p:nvPr>
+        </p:nvSpPr>
+        <p:spPr>
+          <a:xfrm>
+            <a:off x="0" y="0"/>
+            <a:ext cx="12192000" cy="6858000"/>
+          </a:xfrm>
+          <a:prstGeom prst="rect">
+            <a:avLst/>
+          </a:prstGeom>
+          <a:ln w="12700" cap="flat" cmpd="sng" algn="ctr">
+            <a:noFill/>
+            <a:prstDash val="solid"/>
+            <a:miter lim="800000"/>
+          </a:ln>
+          <a:effectLst/>
+          <a:extLst>
+            <a:ext uri="{91240B29-F687-4F45-9708-019B960494DF}">
+              <a14:hiddenLine xmlns:a14="http://schemas.microsoft.com/office/drawing/2010/main" w="12700" cap="flat" cmpd="sng" algn="ctr">
+                <a:solidFill>
+                  <a:schemeClr val="accent1">
+                    <a:shade val="50000"/>
+                  </a:schemeClr>
+                </a:solidFill>
+                <a:prstDash val="solid"/>
+                <a:miter lim="800000"/>
+              </a14:hiddenLine>
+            </a:ext>
+          </a:extLst>
+        </p:spPr>
+        <p:style>
+          <a:lnRef idx="2">
+            <a:schemeClr val="accent1">
+              <a:shade val="50000"/>
+            </a:schemeClr>
+          </a:lnRef>
+          <a:fillRef idx="1">
+            <a:schemeClr val="accent1"/>
+          </a:fillRef>
+          <a:effectRef idx="0">
+            <a:schemeClr val="accent1"/>
+          </a:effectRef>
+          <a:fontRef idx="minor">
+            <a:schemeClr val="lt1"/>
+          </a:fontRef>
+        </p:style>
+        <p:txBody>
+          <a:bodyPr rtlCol="0" anchor="ctr"/>
+          <a:lstStyle/>
+          <a:p>
+            <a:pPr algn="ctr"/>
+            <a:endParaRPr lang="en-US"/>
+          </a:p>
+        </p:txBody>
+      </p:sp>
+      <p:sp>
+        <p:nvSpPr>
+          <p:cNvPr id="2" name="Title 1">
+            <a:extLst>
+              <a:ext uri="{FF2B5EF4-FFF2-40B4-BE49-F238E27FC236}">
+                <a16:creationId xmlns:a16="http://schemas.microsoft.com/office/drawing/2014/main" id="{AAB87A54-5366-E4D4-CAFF-4C7FE83BE59E}"/>
+              </a:ext>
+            </a:extLst>
+          </p:cNvPr>
+          <p:cNvSpPr>
+            <a:spLocks noGrp="1"/>
+          </p:cNvSpPr>
+          <p:nvPr>
+            <p:ph type="title"/>
+          </p:nvPr>
+        </p:nvSpPr>
+        <p:spPr>
+          <a:xfrm>
+            <a:off x="704088" y="914400"/>
+            <a:ext cx="5195889" cy="1316736"/>
+          </a:xfrm>
+        </p:spPr>
+        <p:txBody>
+          <a:bodyPr>
+            <a:normAutofit fontScale="90000"/>
+          </a:bodyPr>
+          <a:lstStyle/>
+          <a:p>
+            <a:r>
+              <a:rPr lang="en-US" dirty="0" smtClean="0"/>
+              <a:t>Words that </a:t>
+            </a:r>
+            <a:br>
+              <a:rPr lang="en-US" dirty="0" smtClean="0"/>
+            </a:br>
+            <a:r>
+              <a:rPr lang="en-US" dirty="0" smtClean="0"/>
+              <a:t>guided model performance</a:t>
+            </a:r>
+            <a:endParaRPr lang="en-US" dirty="0"/>
+          </a:p>
+        </p:txBody>
+      </p:sp>
+      <p:cxnSp>
+        <p:nvCxnSpPr>
+          <p:cNvPr id="14" name="Straight Connector 13">
+            <a:extLst>
+              <a:ext uri="{FF2B5EF4-FFF2-40B4-BE49-F238E27FC236}">
+                <a16:creationId xmlns:a16="http://schemas.microsoft.com/office/drawing/2014/main" id="{F2B951FD-94F7-E138-3EC2-A66A551D9137}"/>
+              </a:ext>
+              <a:ext uri="{C183D7F6-B498-43B3-948B-1728B52AA6E4}">
+                <adec:decorative xmlns:adec="http://schemas.microsoft.com/office/drawing/2017/decorative" xmlns="" val="1"/>
+              </a:ext>
+            </a:extLst>
+          </p:cNvPr>
+          <p:cNvCxnSpPr>
+            <a:cxnSpLocks noGrp="1" noRot="1" noChangeAspect="1" noMove="1" noResize="1" noEditPoints="1" noAdjustHandles="1" noChangeArrowheads="1" noChangeShapeType="1"/>
+          </p:cNvCxnSpPr>
+          <p:nvPr>
+            <p:extLst>
+              <p:ext uri="{386F3935-93C4-4BCD-93E2-E3B085C9AB24}">
+                <p16:designElem xmlns:p16="http://schemas.microsoft.com/office/powerpoint/2015/main" val="1"/>
+              </p:ext>
+            </p:extLst>
+          </p:nvPr>
+        </p:nvCxnSpPr>
+        <p:spPr>
+          <a:xfrm>
+            <a:off x="804672" y="722376"/>
+            <a:ext cx="1638300" cy="0"/>
+          </a:xfrm>
+          <a:prstGeom prst="line">
+            <a:avLst/>
+          </a:prstGeom>
+          <a:ln w="44450">
+            <a:solidFill>
+              <a:schemeClr val="tx1"/>
+            </a:solidFill>
+          </a:ln>
+        </p:spPr>
+        <p:style>
+          <a:lnRef idx="1">
+            <a:schemeClr val="accent1"/>
+          </a:lnRef>
+          <a:fillRef idx="0">
+            <a:schemeClr val="accent1"/>
+          </a:fillRef>
+          <a:effectRef idx="0">
+            <a:schemeClr val="accent1"/>
+          </a:effectRef>
+          <a:fontRef idx="minor">
+            <a:schemeClr val="tx1"/>
+          </a:fontRef>
+        </p:style>
+      </p:cxnSp>
+      <p:sp>
+        <p:nvSpPr>
+          <p:cNvPr id="3" name="Content Placeholder 2">
+            <a:extLst>
+              <a:ext uri="{FF2B5EF4-FFF2-40B4-BE49-F238E27FC236}">
+                <a16:creationId xmlns:a16="http://schemas.microsoft.com/office/drawing/2014/main" id="{B5A594D9-A825-78AA-E548-A860A7C60FF0}"/>
+              </a:ext>
+            </a:extLst>
+          </p:cNvPr>
+          <p:cNvSpPr>
+            <a:spLocks noGrp="1"/>
+          </p:cNvSpPr>
+          <p:nvPr>
+            <p:ph idx="1"/>
+          </p:nvPr>
+        </p:nvSpPr>
+        <p:spPr>
+          <a:xfrm>
+            <a:off x="704088" y="2771192"/>
+            <a:ext cx="5195889" cy="3391864"/>
+          </a:xfrm>
+        </p:spPr>
+        <p:txBody>
+          <a:bodyPr vert="horz" lIns="91440" tIns="45720" rIns="91440" bIns="45720" rtlCol="0" anchor="t">
+            <a:normAutofit/>
+          </a:bodyPr>
+          <a:lstStyle/>
+          <a:p>
+            <a:pPr marL="0" indent="0">
+              <a:lnSpc>
+                <a:spcPct val="100000"/>
+              </a:lnSpc>
+              <a:buNone/>
+            </a:pPr>
+            <a:r>
+              <a:rPr lang="en-US" sz="1600" dirty="0">
+                <a:latin typeface="Cambria"/>
+                <a:cs typeface="Helvetica"/>
+              </a:rPr>
+              <a:t/>
+            </a:r>
+            <a:br>
+              <a:rPr lang="en-US" sz="1600" dirty="0">
+                <a:latin typeface="Cambria"/>
+                <a:cs typeface="Helvetica"/>
+              </a:rPr>
+            </a:br>
+            <a:r>
+              <a:rPr lang="en-US" sz="1600" dirty="0" smtClean="0">
+                <a:latin typeface="Cambria"/>
+                <a:cs typeface="Helvetica"/>
+              </a:rPr>
+              <a:t>The words across in the graph here are what helped </a:t>
+            </a:r>
+          </a:p>
+          <a:p>
+            <a:pPr marL="0" indent="0">
+              <a:lnSpc>
+                <a:spcPct val="100000"/>
+              </a:lnSpc>
+              <a:buNone/>
+            </a:pPr>
+            <a:r>
+              <a:rPr lang="en-US" sz="1600" dirty="0" smtClean="0">
+                <a:latin typeface="Cambria"/>
+                <a:cs typeface="Helvetica"/>
+              </a:rPr>
+              <a:t>guide the model and have been ranked by magnitude.</a:t>
+            </a:r>
+          </a:p>
+          <a:p>
+            <a:pPr marL="0" indent="0">
+              <a:lnSpc>
+                <a:spcPct val="100000"/>
+              </a:lnSpc>
+              <a:buNone/>
+            </a:pPr>
+            <a:r>
+              <a:rPr lang="en-US" sz="1600" dirty="0" smtClean="0">
+                <a:latin typeface="Cambria"/>
+                <a:ea typeface="Cambria"/>
+                <a:cs typeface="Helvetica"/>
+              </a:rPr>
+              <a:t>They assisted the Random Forest model.</a:t>
+            </a:r>
+            <a:r>
+              <a:rPr lang="en-US" sz="1600" dirty="0" smtClean="0">
+                <a:latin typeface="Cambria"/>
+                <a:ea typeface="Cambria"/>
+                <a:cs typeface="Helvetica"/>
+              </a:rPr>
+              <a:t> </a:t>
+            </a:r>
+            <a:endParaRPr lang="en-US" sz="1600" dirty="0">
+              <a:latin typeface="Cambria"/>
+              <a:ea typeface="Cambria"/>
+            </a:endParaRPr>
+          </a:p>
+        </p:txBody>
+      </p:sp>
+      <p:pic>
+        <p:nvPicPr>
+          <p:cNvPr id="4" name="Picture 3"/>
+          <p:cNvPicPr>
+            <a:picLocks noChangeAspect="1"/>
+          </p:cNvPicPr>
+          <p:nvPr/>
+        </p:nvPicPr>
+        <p:blipFill>
+          <a:blip r:embed="rId2"/>
+          <a:stretch>
+            <a:fillRect/>
+          </a:stretch>
+        </p:blipFill>
+        <p:spPr>
+          <a:xfrm>
+            <a:off x="5523722" y="0"/>
+            <a:ext cx="6668278" cy="6858000"/>
+          </a:xfrm>
+          <a:prstGeom prst="rect">
+            <a:avLst/>
+          </a:prstGeom>
+        </p:spPr>
+      </p:pic>
+    </p:spTree>
+    <p:extLst>
+      <p:ext uri="{BB962C8B-B14F-4D97-AF65-F5344CB8AC3E}">
+        <p14:creationId xmlns:p14="http://schemas.microsoft.com/office/powerpoint/2010/main" val="250294884"/>
+      </p:ext>
+    </p:extLst>
+  </p:cSld>
+  <p:clrMapOvr>
+    <a:masterClrMapping/>
+  </p:clrMapOvr>
+</p:sld>
+</file>
+
+<file path=ppt/slides/slide13.xml><?xml version="1.0" encoding="utf-8"?>
+<p:sld xmlns:a="http://schemas.openxmlformats.org/drawingml/2006/main" xmlns:r="http://schemas.openxmlformats.org/officeDocument/2006/relationships" xmlns:p="http://schemas.openxmlformats.org/presentationml/2006/main">
+  <p:cSld>
+    <p:bg>
+      <p:bgPr>
+        <a:solidFill>
+          <a:schemeClr val="bg1"/>
+        </a:solidFill>
+        <a:effectLst/>
+      </p:bgPr>
+    </p:bg>
+    <p:spTree>
+      <p:nvGrpSpPr>
+        <p:cNvPr id="1" name=""/>
+        <p:cNvGrpSpPr/>
+        <p:nvPr/>
+      </p:nvGrpSpPr>
+      <p:grpSpPr>
+        <a:xfrm>
+          <a:off x="0" y="0"/>
+          <a:ext cx="0" cy="0"/>
+          <a:chOff x="0" y="0"/>
+          <a:chExt cx="0" cy="0"/>
+        </a:xfrm>
+      </p:grpSpPr>
       <p:cxnSp>
         <p:nvCxnSpPr>
           <p:cNvPr id="9" name="Straight Connector 8">
@@ -7647,7 +8315,7 @@
 </p:sld>
 </file>
 
-<file path=ppt/slides/slide12.xml><?xml version="1.0" encoding="utf-8"?>
+<file path=ppt/slides/slide14.xml><?xml version="1.0" encoding="utf-8"?>
 <p:sld xmlns:a="http://schemas.openxmlformats.org/drawingml/2006/main" xmlns:r="http://schemas.openxmlformats.org/officeDocument/2006/relationships" xmlns:p="http://schemas.openxmlformats.org/presentationml/2006/main">
   <p:cSld>
     <p:bg>
@@ -7967,7 +8635,7 @@
 </p:sld>
 </file>
 
-<file path=ppt/slides/slide13.xml><?xml version="1.0" encoding="utf-8"?>
+<file path=ppt/slides/slide15.xml><?xml version="1.0" encoding="utf-8"?>
 <p:sld xmlns:a="http://schemas.openxmlformats.org/drawingml/2006/main" xmlns:r="http://schemas.openxmlformats.org/officeDocument/2006/relationships" xmlns:p="http://schemas.openxmlformats.org/presentationml/2006/main">
   <p:cSld>
     <p:bg>
@@ -8252,7 +8920,7 @@
 </p:sld>
 </file>
 
-<file path=ppt/slides/slide14.xml><?xml version="1.0" encoding="utf-8"?>
+<file path=ppt/slides/slide16.xml><?xml version="1.0" encoding="utf-8"?>
 <p:sld xmlns:a="http://schemas.openxmlformats.org/drawingml/2006/main" xmlns:r="http://schemas.openxmlformats.org/officeDocument/2006/relationships" xmlns:p="http://schemas.openxmlformats.org/presentationml/2006/main">
   <p:cSld>
     <p:bg>
@@ -8529,7 +9197,7 @@
 </p:sld>
 </file>
 
-<file path=ppt/slides/slide15.xml><?xml version="1.0" encoding="utf-8"?>
+<file path=ppt/slides/slide17.xml><?xml version="1.0" encoding="utf-8"?>
 <p:sld xmlns:a="http://schemas.openxmlformats.org/drawingml/2006/main" xmlns:r="http://schemas.openxmlformats.org/officeDocument/2006/relationships" xmlns:p="http://schemas.openxmlformats.org/presentationml/2006/main">
   <p:cSld>
     <p:bg>
@@ -8899,7 +9567,7 @@
 </p:sld>
 </file>
 
-<file path=ppt/slides/slide16.xml><?xml version="1.0" encoding="utf-8"?>
+<file path=ppt/slides/slide18.xml><?xml version="1.0" encoding="utf-8"?>
 <p:sld xmlns:a="http://schemas.openxmlformats.org/drawingml/2006/main" xmlns:r="http://schemas.openxmlformats.org/officeDocument/2006/relationships" xmlns:p="http://schemas.openxmlformats.org/presentationml/2006/main">
   <p:cSld>
     <p:bg>
@@ -9246,7 +9914,7 @@
 </p:sld>
 </file>
 
-<file path=ppt/slides/slide17.xml><?xml version="1.0" encoding="utf-8"?>
+<file path=ppt/slides/slide19.xml><?xml version="1.0" encoding="utf-8"?>
 <p:sld xmlns:a="http://schemas.openxmlformats.org/drawingml/2006/main" xmlns:r="http://schemas.openxmlformats.org/officeDocument/2006/relationships" xmlns:p="http://schemas.openxmlformats.org/presentationml/2006/main">
   <p:cSld>
     <p:bg>
@@ -9574,7 +10242,7 @@
 </p:sld>
 </file>
 
-<file path=ppt/slides/slide18.xml><?xml version="1.0" encoding="utf-8"?>
+<file path=ppt/slides/slide2.xml><?xml version="1.0" encoding="utf-8"?>
 <p:sld xmlns:a="http://schemas.openxmlformats.org/drawingml/2006/main" xmlns:r="http://schemas.openxmlformats.org/officeDocument/2006/relationships" xmlns:p="http://schemas.openxmlformats.org/presentationml/2006/main">
   <p:cSld>
     <p:bg>
@@ -9680,7 +10348,7 @@
           <p:cNvPr id="2" name="Title 1">
             <a:extLst>
               <a:ext uri="{FF2B5EF4-FFF2-40B4-BE49-F238E27FC236}">
-                <a16:creationId xmlns:a16="http://schemas.microsoft.com/office/drawing/2014/main" id="{7CA4F20F-16FE-6A10-589E-7F2E1A94D9AB}"/>
+                <a16:creationId xmlns:a16="http://schemas.microsoft.com/office/drawing/2014/main" id="{7C6AB574-3A85-731E-A48A-600AAFB69A31}"/>
               </a:ext>
             </a:extLst>
           </p:cNvPr>
@@ -9694,7 +10362,7 @@
         <p:spPr>
           <a:xfrm>
             <a:off x="704088" y="914400"/>
-            <a:ext cx="6239599" cy="1307590"/>
+            <a:ext cx="5195889" cy="1316736"/>
           </a:xfrm>
         </p:spPr>
         <p:txBody>
@@ -9703,16 +10371,29 @@
           </a:bodyPr>
           <a:lstStyle/>
           <a:p>
-            <a:r>
-              <a:rPr lang="en-US">
+            <a:pPr>
+              <a:lnSpc>
+                <a:spcPct val="90000"/>
+              </a:lnSpc>
+            </a:pPr>
+            <a:r>
+              <a:rPr lang="en-US" sz="2800">
                 <a:effectLst/>
                 <a:latin typeface="Cambria" panose="02040503050406030204" pitchFamily="18" charset="0"/>
                 <a:ea typeface="MS Mincho" panose="02020609040205080304" pitchFamily="49" charset="-128"/>
                 <a:cs typeface="Times New Roman" panose="02020603050405020304" pitchFamily="18" charset="0"/>
               </a:rPr>
-              <a:t>Regular Monitoring</a:t>
-            </a:r>
-            <a:endParaRPr lang="en-US"/>
+              <a:t> Business Understanding</a:t>
+            </a:r>
+            <a:br>
+              <a:rPr lang="en-US" sz="2800">
+                <a:effectLst/>
+                <a:latin typeface="Cambria" panose="02040503050406030204" pitchFamily="18" charset="0"/>
+                <a:ea typeface="MS Mincho" panose="02020609040205080304" pitchFamily="49" charset="-128"/>
+                <a:cs typeface="Times New Roman" panose="02020603050405020304" pitchFamily="18" charset="0"/>
+              </a:rPr>
+            </a:br>
+            <a:endParaRPr lang="en-US" sz="2800"/>
           </a:p>
         </p:txBody>
       </p:sp>
@@ -9721,7 +10402,7 @@
           <p:cNvPr id="11" name="Straight Connector 10">
             <a:extLst>
               <a:ext uri="{FF2B5EF4-FFF2-40B4-BE49-F238E27FC236}">
-                <a16:creationId xmlns:a16="http://schemas.microsoft.com/office/drawing/2014/main" id="{3815BE95-1337-20E2-B2EF-5DA486F72FCB}"/>
+                <a16:creationId xmlns:a16="http://schemas.microsoft.com/office/drawing/2014/main" id="{F2B951FD-94F7-E138-3EC2-A66A551D9137}"/>
               </a:ext>
               <a:ext uri="{C183D7F6-B498-43B3-948B-1728B52AA6E4}">
                 <adec:decorative xmlns:adec="http://schemas.microsoft.com/office/drawing/2017/decorative" xmlns="" val="1"/>
@@ -9773,7 +10454,7 @@
           <p:cNvPr id="3" name="Content Placeholder 2">
             <a:extLst>
               <a:ext uri="{FF2B5EF4-FFF2-40B4-BE49-F238E27FC236}">
-                <a16:creationId xmlns:a16="http://schemas.microsoft.com/office/drawing/2014/main" id="{871089F7-552F-B8C8-959A-7C8044B01931}"/>
+                <a16:creationId xmlns:a16="http://schemas.microsoft.com/office/drawing/2014/main" id="{48C63268-2EB6-E421-78D9-31FD479BC589}"/>
               </a:ext>
             </a:extLst>
           </p:cNvPr>
@@ -9786,8 +10467,8 @@
         </p:nvSpPr>
         <p:spPr>
           <a:xfrm>
-            <a:off x="704088" y="2221992"/>
-            <a:ext cx="6239599" cy="3941064"/>
+            <a:off x="704088" y="2231136"/>
+            <a:ext cx="5195889" cy="3931920"/>
           </a:xfrm>
         </p:spPr>
         <p:txBody>
@@ -9796,79 +10477,93 @@
           </a:bodyPr>
           <a:lstStyle/>
           <a:p>
-            <a:r>
-              <a:rPr lang="en-US">
+            <a:pPr>
+              <a:lnSpc>
+                <a:spcPct val="100000"/>
+              </a:lnSpc>
+            </a:pPr>
+            <a:r>
+              <a:rPr lang="en-US" sz="1700">
                 <a:effectLst/>
                 <a:latin typeface="Cambria"/>
                 <a:ea typeface="MS Mincho"/>
                 <a:cs typeface="Times New Roman"/>
               </a:rPr>
-              <a:t>Continuously monitor model performance post-deployment to ensure it remains effective as new data becomes available. </a:t>
-            </a:r>
-            <a:endParaRPr lang="en-US">
-              <a:latin typeface="Cambria"/>
-              <a:ea typeface="MS Mincho"/>
-              <a:cs typeface="Times New Roman"/>
-            </a:endParaRPr>
-          </a:p>
-          <a:p>
-            <a:r>
-              <a:rPr lang="en-US">
+              <a:t>The rapid growth of e-marketplaces like Amazon has led to an enormous amount of customer-generated data,</a:t>
+            </a:r>
+            <a:r>
+              <a:rPr lang="en-US" sz="1700">
+                <a:latin typeface="Cambria"/>
+                <a:ea typeface="MS Mincho"/>
+                <a:cs typeface="Times New Roman"/>
+              </a:rPr>
+              <a:t> </a:t>
+            </a:r>
+            <a:r>
+              <a:rPr lang="en-US" sz="1700">
                 <a:effectLst/>
                 <a:latin typeface="Cambria"/>
                 <a:ea typeface="MS Mincho"/>
                 <a:cs typeface="Times New Roman"/>
               </a:rPr>
-              <a:t>Retrain the model periodically to adapt to changing customer sentiment trends. </a:t>
-            </a:r>
-            <a:endParaRPr lang="en-US">
-              <a:latin typeface="Cambria"/>
-              <a:ea typeface="MS Mincho"/>
-              <a:cs typeface="Times New Roman"/>
-            </a:endParaRPr>
-          </a:p>
-          <a:p>
-            <a:r>
-              <a:rPr lang="en-US">
+              <a:t>such as product reviews, ratings, and feedback. </a:t>
+            </a:r>
+            <a:endParaRPr lang="en-US"/>
+          </a:p>
+          <a:p>
+            <a:pPr>
+              <a:lnSpc>
+                <a:spcPct val="100000"/>
+              </a:lnSpc>
+            </a:pPr>
+            <a:r>
+              <a:rPr lang="en-US" sz="1700">
                 <a:effectLst/>
                 <a:latin typeface="Cambria"/>
                 <a:ea typeface="MS Mincho"/>
                 <a:cs typeface="Times New Roman"/>
               </a:rPr>
-              <a:t>The </a:t>
-            </a:r>
-            <a:r>
-              <a:rPr lang="en-US" err="1">
+              <a:t>This data contains important information regarding customer feedback, that can directly affect business decisions like product improvements, marketing campaigns, and customer reach programs.</a:t>
+            </a:r>
+            <a:endParaRPr lang="en-US">
+              <a:latin typeface="Calisto MT"/>
+              <a:ea typeface="MS Mincho"/>
+              <a:cs typeface="Times New Roman"/>
+            </a:endParaRPr>
+          </a:p>
+          <a:p>
+            <a:pPr>
+              <a:lnSpc>
+                <a:spcPct val="100000"/>
+              </a:lnSpc>
+            </a:pPr>
+            <a:r>
+              <a:rPr lang="en-US" sz="1700">
                 <a:effectLst/>
                 <a:latin typeface="Cambria"/>
                 <a:ea typeface="MS Mincho"/>
                 <a:cs typeface="Times New Roman"/>
               </a:rPr>
-              <a:t>TextCNN</a:t>
-            </a:r>
-            <a:r>
-              <a:rPr lang="en-US">
-                <a:effectLst/>
-                <a:latin typeface="Cambria"/>
-                <a:ea typeface="MS Mincho"/>
-                <a:cs typeface="Times New Roman"/>
-              </a:rPr>
-              <a:t> began to overfit and this is risky if the model is not regularly monitored</a:t>
-            </a:r>
-            <a:endParaRPr lang="en-US">
-              <a:latin typeface="Cambria"/>
-              <a:ea typeface="MS Mincho"/>
-              <a:cs typeface="Times New Roman"/>
-            </a:endParaRPr>
+              <a:t>For food business firms, understanding customer sentiment regarding their products is critical to product quality, improvement and customer satisfaction.</a:t>
+            </a:r>
+            <a:endParaRPr lang="en-US"/>
+          </a:p>
+          <a:p>
+            <a:pPr>
+              <a:lnSpc>
+                <a:spcPct val="100000"/>
+              </a:lnSpc>
+            </a:pPr>
+            <a:endParaRPr lang="en-US" sz="1700"/>
           </a:p>
         </p:txBody>
       </p:sp>
       <p:pic>
         <p:nvPicPr>
-          <p:cNvPr id="5" name="Picture 4">
-            <a:extLst>
-              <a:ext uri="{FF2B5EF4-FFF2-40B4-BE49-F238E27FC236}">
-                <a16:creationId xmlns:a16="http://schemas.microsoft.com/office/drawing/2014/main" id="{E0D6EF03-072C-8640-8291-F6881C1D8A01}"/>
+          <p:cNvPr id="5" name="Picture 4" descr="Fruits and vegetables in bags">
+            <a:extLst>
+              <a:ext uri="{FF2B5EF4-FFF2-40B4-BE49-F238E27FC236}">
+                <a16:creationId xmlns:a16="http://schemas.microsoft.com/office/drawing/2014/main" id="{A3CC0A9C-35BB-821A-9805-BB6D8E2237CF}"/>
               </a:ext>
             </a:extLst>
           </p:cNvPr>
@@ -9879,13 +10574,13 @@
         </p:nvPicPr>
         <p:blipFill>
           <a:blip r:embed="rId2"/>
-          <a:srcRect r="62032" b="-445"/>
+          <a:srcRect l="35851" r="7976" b="-2"/>
           <a:stretch/>
         </p:blipFill>
         <p:spPr>
           <a:xfrm>
-            <a:off x="7583424" y="10"/>
-            <a:ext cx="4608576" cy="6857990"/>
+            <a:off x="6420752" y="-1"/>
+            <a:ext cx="5771248" cy="6857999"/>
           </a:xfrm>
           <a:prstGeom prst="rect">
             <a:avLst/>
@@ -9895,7 +10590,7 @@
     </p:spTree>
     <p:extLst>
       <p:ext uri="{BB962C8B-B14F-4D97-AF65-F5344CB8AC3E}">
-        <p14:creationId xmlns:p14="http://schemas.microsoft.com/office/powerpoint/2010/main" val="3765045704"/>
+        <p14:creationId xmlns:p14="http://schemas.microsoft.com/office/powerpoint/2010/main" val="2003370814"/>
       </p:ext>
     </p:extLst>
   </p:cSld>
@@ -9905,7 +10600,7 @@
 </p:sld>
 </file>
 
-<file path=ppt/slides/slide19.xml><?xml version="1.0" encoding="utf-8"?>
+<file path=ppt/slides/slide20.xml><?xml version="1.0" encoding="utf-8"?>
 <p:sld xmlns:a="http://schemas.openxmlformats.org/drawingml/2006/main" xmlns:r="http://schemas.openxmlformats.org/officeDocument/2006/relationships" xmlns:p="http://schemas.openxmlformats.org/presentationml/2006/main">
   <p:cSld>
     <p:bg>
@@ -9935,7 +10630,7 @@
           <p:cNvPr id="9" name="Rectangle 8">
             <a:extLst>
               <a:ext uri="{FF2B5EF4-FFF2-40B4-BE49-F238E27FC236}">
-                <a16:creationId xmlns:a16="http://schemas.microsoft.com/office/drawing/2014/main" id="{F68B2C62-7648-4430-90D5-AE0F252AF113}"/>
+                <a16:creationId xmlns:a16="http://schemas.microsoft.com/office/drawing/2014/main" id="{E49D7415-2F11-44C2-B6AA-13A25B6814B9}"/>
               </a:ext>
               <a:ext uri="{C183D7F6-B498-43B3-948B-1728B52AA6E4}">
                 <adec:decorative xmlns:adec="http://schemas.microsoft.com/office/drawing/2017/decorative" xmlns="" val="1"/>
@@ -10011,7 +10706,7 @@
           <p:cNvPr id="2" name="Title 1">
             <a:extLst>
               <a:ext uri="{FF2B5EF4-FFF2-40B4-BE49-F238E27FC236}">
-                <a16:creationId xmlns:a16="http://schemas.microsoft.com/office/drawing/2014/main" id="{1B9F3148-FF56-1F61-6763-5A285CA4DE8D}"/>
+                <a16:creationId xmlns:a16="http://schemas.microsoft.com/office/drawing/2014/main" id="{7CA4F20F-16FE-6A10-589E-7F2E1A94D9AB}"/>
               </a:ext>
             </a:extLst>
           </p:cNvPr>
@@ -10024,8 +10719,8 @@
         </p:nvSpPr>
         <p:spPr>
           <a:xfrm>
-            <a:off x="700087" y="909638"/>
-            <a:ext cx="10691813" cy="1155618"/>
+            <a:off x="704088" y="914400"/>
+            <a:ext cx="6239599" cy="1307590"/>
           </a:xfrm>
         </p:spPr>
         <p:txBody>
@@ -10041,7 +10736,7 @@
                 <a:ea typeface="MS Mincho" panose="02020609040205080304" pitchFamily="49" charset="-128"/>
                 <a:cs typeface="Times New Roman" panose="02020603050405020304" pitchFamily="18" charset="0"/>
               </a:rPr>
-              <a:t>Future Work</a:t>
+              <a:t>Regular Monitoring</a:t>
             </a:r>
             <a:endParaRPr lang="en-US"/>
           </a:p>
@@ -10052,7 +10747,7 @@
           <p:cNvPr id="11" name="Straight Connector 10">
             <a:extLst>
               <a:ext uri="{FF2B5EF4-FFF2-40B4-BE49-F238E27FC236}">
-                <a16:creationId xmlns:a16="http://schemas.microsoft.com/office/drawing/2014/main" id="{AAD0195E-7F27-4D06-9427-0C121D721A14}"/>
+                <a16:creationId xmlns:a16="http://schemas.microsoft.com/office/drawing/2014/main" id="{3815BE95-1337-20E2-B2EF-5DA486F72FCB}"/>
               </a:ext>
               <a:ext uri="{C183D7F6-B498-43B3-948B-1728B52AA6E4}">
                 <adec:decorative xmlns:adec="http://schemas.microsoft.com/office/drawing/2017/decorative" xmlns="" val="1"/>
@@ -10072,8 +10767,8 @@
         </p:nvCxnSpPr>
         <p:spPr>
           <a:xfrm>
-            <a:off x="800100" y="723900"/>
-            <a:ext cx="10591800" cy="0"/>
+            <a:off x="804672" y="722376"/>
+            <a:ext cx="1638300" cy="0"/>
           </a:xfrm>
           <a:prstGeom prst="line">
             <a:avLst/>
@@ -10099,93 +10794,134 @@
           </a:fontRef>
         </p:style>
       </p:cxnSp>
-      <p:cxnSp>
-        <p:nvCxnSpPr>
-          <p:cNvPr id="13" name="Straight Connector 12">
-            <a:extLst>
-              <a:ext uri="{FF2B5EF4-FFF2-40B4-BE49-F238E27FC236}">
-                <a16:creationId xmlns:a16="http://schemas.microsoft.com/office/drawing/2014/main" id="{9D74C2FC-3228-4FC1-B97B-87AD35508D91}"/>
-              </a:ext>
-              <a:ext uri="{C183D7F6-B498-43B3-948B-1728B52AA6E4}">
-                <adec:decorative xmlns:adec="http://schemas.microsoft.com/office/drawing/2017/decorative" xmlns="" val="1"/>
-              </a:ext>
-            </a:extLst>
-          </p:cNvPr>
-          <p:cNvCxnSpPr>
-            <a:cxnSpLocks noGrp="1" noRot="1" noChangeAspect="1" noMove="1" noResize="1" noEditPoints="1" noAdjustHandles="1" noChangeArrowheads="1" noChangeShapeType="1"/>
-          </p:cNvCxnSpPr>
-          <p:nvPr>
-            <p:extLst>
-              <p:ext uri="{386F3935-93C4-4BCD-93E2-E3B085C9AB24}">
-                <p16:designElem xmlns:p16="http://schemas.microsoft.com/office/powerpoint/2015/main" val="1"/>
-              </p:ext>
-            </p:extLst>
-          </p:nvPr>
-        </p:nvCxnSpPr>
+      <p:sp>
+        <p:nvSpPr>
+          <p:cNvPr id="3" name="Content Placeholder 2">
+            <a:extLst>
+              <a:ext uri="{FF2B5EF4-FFF2-40B4-BE49-F238E27FC236}">
+                <a16:creationId xmlns:a16="http://schemas.microsoft.com/office/drawing/2014/main" id="{871089F7-552F-B8C8-959A-7C8044B01931}"/>
+              </a:ext>
+            </a:extLst>
+          </p:cNvPr>
+          <p:cNvSpPr>
+            <a:spLocks noGrp="1"/>
+          </p:cNvSpPr>
+          <p:nvPr>
+            <p:ph idx="1"/>
+          </p:nvPr>
+        </p:nvSpPr>
         <p:spPr>
           <a:xfrm>
-            <a:off x="800100" y="6142781"/>
-            <a:ext cx="10591800" cy="0"/>
+            <a:off x="704088" y="2221992"/>
+            <a:ext cx="6239599" cy="3941064"/>
           </a:xfrm>
-          <a:prstGeom prst="line">
+        </p:spPr>
+        <p:txBody>
+          <a:bodyPr vert="horz" lIns="91440" tIns="45720" rIns="91440" bIns="45720" rtlCol="0" anchor="t">
+            <a:normAutofit/>
+          </a:bodyPr>
+          <a:lstStyle/>
+          <a:p>
+            <a:r>
+              <a:rPr lang="en-US">
+                <a:effectLst/>
+                <a:latin typeface="Cambria"/>
+                <a:ea typeface="MS Mincho"/>
+                <a:cs typeface="Times New Roman"/>
+              </a:rPr>
+              <a:t>Continuously monitor model performance post-deployment to ensure it remains effective as new data becomes available. </a:t>
+            </a:r>
+            <a:endParaRPr lang="en-US">
+              <a:latin typeface="Cambria"/>
+              <a:ea typeface="MS Mincho"/>
+              <a:cs typeface="Times New Roman"/>
+            </a:endParaRPr>
+          </a:p>
+          <a:p>
+            <a:r>
+              <a:rPr lang="en-US">
+                <a:effectLst/>
+                <a:latin typeface="Cambria"/>
+                <a:ea typeface="MS Mincho"/>
+                <a:cs typeface="Times New Roman"/>
+              </a:rPr>
+              <a:t>Retrain the model periodically to adapt to changing customer sentiment trends. </a:t>
+            </a:r>
+            <a:endParaRPr lang="en-US">
+              <a:latin typeface="Cambria"/>
+              <a:ea typeface="MS Mincho"/>
+              <a:cs typeface="Times New Roman"/>
+            </a:endParaRPr>
+          </a:p>
+          <a:p>
+            <a:r>
+              <a:rPr lang="en-US">
+                <a:effectLst/>
+                <a:latin typeface="Cambria"/>
+                <a:ea typeface="MS Mincho"/>
+                <a:cs typeface="Times New Roman"/>
+              </a:rPr>
+              <a:t>The </a:t>
+            </a:r>
+            <a:r>
+              <a:rPr lang="en-US" err="1">
+                <a:effectLst/>
+                <a:latin typeface="Cambria"/>
+                <a:ea typeface="MS Mincho"/>
+                <a:cs typeface="Times New Roman"/>
+              </a:rPr>
+              <a:t>TextCNN</a:t>
+            </a:r>
+            <a:r>
+              <a:rPr lang="en-US">
+                <a:effectLst/>
+                <a:latin typeface="Cambria"/>
+                <a:ea typeface="MS Mincho"/>
+                <a:cs typeface="Times New Roman"/>
+              </a:rPr>
+              <a:t> began to overfit and this is risky if the model is not regularly monitored</a:t>
+            </a:r>
+            <a:endParaRPr lang="en-US">
+              <a:latin typeface="Cambria"/>
+              <a:ea typeface="MS Mincho"/>
+              <a:cs typeface="Times New Roman"/>
+            </a:endParaRPr>
+          </a:p>
+        </p:txBody>
+      </p:sp>
+      <p:pic>
+        <p:nvPicPr>
+          <p:cNvPr id="5" name="Picture 4">
+            <a:extLst>
+              <a:ext uri="{FF2B5EF4-FFF2-40B4-BE49-F238E27FC236}">
+                <a16:creationId xmlns:a16="http://schemas.microsoft.com/office/drawing/2014/main" id="{E0D6EF03-072C-8640-8291-F6881C1D8A01}"/>
+              </a:ext>
+            </a:extLst>
+          </p:cNvPr>
+          <p:cNvPicPr>
+            <a:picLocks noChangeAspect="1"/>
+          </p:cNvPicPr>
+          <p:nvPr/>
+        </p:nvPicPr>
+        <p:blipFill>
+          <a:blip r:embed="rId2"/>
+          <a:srcRect r="62032" b="-445"/>
+          <a:stretch/>
+        </p:blipFill>
+        <p:spPr>
+          <a:xfrm>
+            <a:off x="7583424" y="10"/>
+            <a:ext cx="4608576" cy="6857990"/>
+          </a:xfrm>
+          <a:prstGeom prst="rect">
             <a:avLst/>
           </a:prstGeom>
-          <a:ln w="12700">
-            <a:solidFill>
-              <a:schemeClr val="tx1"/>
-            </a:solidFill>
-          </a:ln>
         </p:spPr>
-        <p:style>
-          <a:lnRef idx="1">
-            <a:schemeClr val="accent1"/>
-          </a:lnRef>
-          <a:fillRef idx="0">
-            <a:schemeClr val="accent1"/>
-          </a:fillRef>
-          <a:effectRef idx="0">
-            <a:schemeClr val="accent1"/>
-          </a:effectRef>
-          <a:fontRef idx="minor">
-            <a:schemeClr val="tx1"/>
-          </a:fontRef>
-        </p:style>
-      </p:cxnSp>
-      <p:graphicFrame>
-        <p:nvGraphicFramePr>
-          <p:cNvPr id="6" name="Content Placeholder 2">
-            <a:extLst>
-              <a:ext uri="{FF2B5EF4-FFF2-40B4-BE49-F238E27FC236}">
-                <a16:creationId xmlns:a16="http://schemas.microsoft.com/office/drawing/2014/main" id="{372CC5D4-A8EE-12D0-0718-083495ACAF38}"/>
-              </a:ext>
-            </a:extLst>
-          </p:cNvPr>
-          <p:cNvGraphicFramePr>
-            <a:graphicFrameLocks noGrp="1"/>
-          </p:cNvGraphicFramePr>
-          <p:nvPr>
-            <p:ph idx="1"/>
-            <p:extLst>
-              <p:ext uri="{D42A27DB-BD31-4B8C-83A1-F6EECF244321}">
-                <p14:modId xmlns:p14="http://schemas.microsoft.com/office/powerpoint/2010/main" val="1990463114"/>
-              </p:ext>
-            </p:extLst>
-          </p:nvPr>
-        </p:nvGraphicFramePr>
-        <p:xfrm>
-          <a:off x="700088" y="2222500"/>
-          <a:ext cx="10691812" cy="3740150"/>
-        </p:xfrm>
-        <a:graphic>
-          <a:graphicData uri="http://schemas.openxmlformats.org/drawingml/2006/diagram">
-            <dgm:relIds xmlns:dgm="http://schemas.openxmlformats.org/drawingml/2006/diagram" xmlns:r="http://schemas.openxmlformats.org/officeDocument/2006/relationships" r:dm="rId2" r:lo="rId3" r:qs="rId4" r:cs="rId5"/>
-          </a:graphicData>
-        </a:graphic>
-      </p:graphicFrame>
+      </p:pic>
     </p:spTree>
     <p:extLst>
       <p:ext uri="{BB962C8B-B14F-4D97-AF65-F5344CB8AC3E}">
-        <p14:creationId xmlns:p14="http://schemas.microsoft.com/office/powerpoint/2010/main" val="3243244310"/>
+        <p14:creationId xmlns:p14="http://schemas.microsoft.com/office/powerpoint/2010/main" val="3765045704"/>
       </p:ext>
     </p:extLst>
   </p:cSld>
@@ -10195,7 +10931,7 @@
 </p:sld>
 </file>
 
-<file path=ppt/slides/slide2.xml><?xml version="1.0" encoding="utf-8"?>
+<file path=ppt/slides/slide21.xml><?xml version="1.0" encoding="utf-8"?>
 <p:sld xmlns:a="http://schemas.openxmlformats.org/drawingml/2006/main" xmlns:r="http://schemas.openxmlformats.org/officeDocument/2006/relationships" xmlns:p="http://schemas.openxmlformats.org/presentationml/2006/main">
   <p:cSld>
     <p:bg>
@@ -10225,7 +10961,7 @@
           <p:cNvPr id="9" name="Rectangle 8">
             <a:extLst>
               <a:ext uri="{FF2B5EF4-FFF2-40B4-BE49-F238E27FC236}">
-                <a16:creationId xmlns:a16="http://schemas.microsoft.com/office/drawing/2014/main" id="{E49D7415-2F11-44C2-B6AA-13A25B6814B9}"/>
+                <a16:creationId xmlns:a16="http://schemas.microsoft.com/office/drawing/2014/main" id="{F68B2C62-7648-4430-90D5-AE0F252AF113}"/>
               </a:ext>
               <a:ext uri="{C183D7F6-B498-43B3-948B-1728B52AA6E4}">
                 <adec:decorative xmlns:adec="http://schemas.microsoft.com/office/drawing/2017/decorative" xmlns="" val="1"/>
@@ -10301,7 +11037,7 @@
           <p:cNvPr id="2" name="Title 1">
             <a:extLst>
               <a:ext uri="{FF2B5EF4-FFF2-40B4-BE49-F238E27FC236}">
-                <a16:creationId xmlns:a16="http://schemas.microsoft.com/office/drawing/2014/main" id="{7C6AB574-3A85-731E-A48A-600AAFB69A31}"/>
+                <a16:creationId xmlns:a16="http://schemas.microsoft.com/office/drawing/2014/main" id="{1B9F3148-FF56-1F61-6763-5A285CA4DE8D}"/>
               </a:ext>
             </a:extLst>
           </p:cNvPr>
@@ -10314,8 +11050,8 @@
         </p:nvSpPr>
         <p:spPr>
           <a:xfrm>
-            <a:off x="704088" y="914400"/>
-            <a:ext cx="5195889" cy="1316736"/>
+            <a:off x="700087" y="909638"/>
+            <a:ext cx="10691813" cy="1155618"/>
           </a:xfrm>
         </p:spPr>
         <p:txBody>
@@ -10324,29 +11060,16 @@
           </a:bodyPr>
           <a:lstStyle/>
           <a:p>
-            <a:pPr>
-              <a:lnSpc>
-                <a:spcPct val="90000"/>
-              </a:lnSpc>
-            </a:pPr>
-            <a:r>
-              <a:rPr lang="en-US" sz="2800">
+            <a:r>
+              <a:rPr lang="en-US">
                 <a:effectLst/>
                 <a:latin typeface="Cambria" panose="02040503050406030204" pitchFamily="18" charset="0"/>
                 <a:ea typeface="MS Mincho" panose="02020609040205080304" pitchFamily="49" charset="-128"/>
                 <a:cs typeface="Times New Roman" panose="02020603050405020304" pitchFamily="18" charset="0"/>
               </a:rPr>
-              <a:t> Business Understanding</a:t>
-            </a:r>
-            <a:br>
-              <a:rPr lang="en-US" sz="2800">
-                <a:effectLst/>
-                <a:latin typeface="Cambria" panose="02040503050406030204" pitchFamily="18" charset="0"/>
-                <a:ea typeface="MS Mincho" panose="02020609040205080304" pitchFamily="49" charset="-128"/>
-                <a:cs typeface="Times New Roman" panose="02020603050405020304" pitchFamily="18" charset="0"/>
-              </a:rPr>
-            </a:br>
-            <a:endParaRPr lang="en-US" sz="2800"/>
+              <a:t>Future Work</a:t>
+            </a:r>
+            <a:endParaRPr lang="en-US"/>
           </a:p>
         </p:txBody>
       </p:sp>
@@ -10355,7 +11078,7 @@
           <p:cNvPr id="11" name="Straight Connector 10">
             <a:extLst>
               <a:ext uri="{FF2B5EF4-FFF2-40B4-BE49-F238E27FC236}">
-                <a16:creationId xmlns:a16="http://schemas.microsoft.com/office/drawing/2014/main" id="{F2B951FD-94F7-E138-3EC2-A66A551D9137}"/>
+                <a16:creationId xmlns:a16="http://schemas.microsoft.com/office/drawing/2014/main" id="{AAD0195E-7F27-4D06-9427-0C121D721A14}"/>
               </a:ext>
               <a:ext uri="{C183D7F6-B498-43B3-948B-1728B52AA6E4}">
                 <adec:decorative xmlns:adec="http://schemas.microsoft.com/office/drawing/2017/decorative" xmlns="" val="1"/>
@@ -10375,8 +11098,8 @@
         </p:nvCxnSpPr>
         <p:spPr>
           <a:xfrm>
-            <a:off x="804672" y="722376"/>
-            <a:ext cx="1638300" cy="0"/>
+            <a:off x="800100" y="723900"/>
+            <a:ext cx="10591800" cy="0"/>
           </a:xfrm>
           <a:prstGeom prst="line">
             <a:avLst/>
@@ -10402,148 +11125,93 @@
           </a:fontRef>
         </p:style>
       </p:cxnSp>
-      <p:sp>
-        <p:nvSpPr>
-          <p:cNvPr id="3" name="Content Placeholder 2">
-            <a:extLst>
-              <a:ext uri="{FF2B5EF4-FFF2-40B4-BE49-F238E27FC236}">
-                <a16:creationId xmlns:a16="http://schemas.microsoft.com/office/drawing/2014/main" id="{48C63268-2EB6-E421-78D9-31FD479BC589}"/>
-              </a:ext>
-            </a:extLst>
-          </p:cNvPr>
-          <p:cNvSpPr>
-            <a:spLocks noGrp="1"/>
-          </p:cNvSpPr>
-          <p:nvPr>
-            <p:ph idx="1"/>
-          </p:nvPr>
-        </p:nvSpPr>
+      <p:cxnSp>
+        <p:nvCxnSpPr>
+          <p:cNvPr id="13" name="Straight Connector 12">
+            <a:extLst>
+              <a:ext uri="{FF2B5EF4-FFF2-40B4-BE49-F238E27FC236}">
+                <a16:creationId xmlns:a16="http://schemas.microsoft.com/office/drawing/2014/main" id="{9D74C2FC-3228-4FC1-B97B-87AD35508D91}"/>
+              </a:ext>
+              <a:ext uri="{C183D7F6-B498-43B3-948B-1728B52AA6E4}">
+                <adec:decorative xmlns:adec="http://schemas.microsoft.com/office/drawing/2017/decorative" xmlns="" val="1"/>
+              </a:ext>
+            </a:extLst>
+          </p:cNvPr>
+          <p:cNvCxnSpPr>
+            <a:cxnSpLocks noGrp="1" noRot="1" noChangeAspect="1" noMove="1" noResize="1" noEditPoints="1" noAdjustHandles="1" noChangeArrowheads="1" noChangeShapeType="1"/>
+          </p:cNvCxnSpPr>
+          <p:nvPr>
+            <p:extLst>
+              <p:ext uri="{386F3935-93C4-4BCD-93E2-E3B085C9AB24}">
+                <p16:designElem xmlns:p16="http://schemas.microsoft.com/office/powerpoint/2015/main" val="1"/>
+              </p:ext>
+            </p:extLst>
+          </p:nvPr>
+        </p:nvCxnSpPr>
         <p:spPr>
           <a:xfrm>
-            <a:off x="704088" y="2231136"/>
-            <a:ext cx="5195889" cy="3931920"/>
+            <a:off x="800100" y="6142781"/>
+            <a:ext cx="10591800" cy="0"/>
           </a:xfrm>
-        </p:spPr>
-        <p:txBody>
-          <a:bodyPr vert="horz" lIns="91440" tIns="45720" rIns="91440" bIns="45720" rtlCol="0" anchor="t">
-            <a:normAutofit/>
-          </a:bodyPr>
-          <a:lstStyle/>
-          <a:p>
-            <a:pPr>
-              <a:lnSpc>
-                <a:spcPct val="100000"/>
-              </a:lnSpc>
-            </a:pPr>
-            <a:r>
-              <a:rPr lang="en-US" sz="1700">
-                <a:effectLst/>
-                <a:latin typeface="Cambria"/>
-                <a:ea typeface="MS Mincho"/>
-                <a:cs typeface="Times New Roman"/>
-              </a:rPr>
-              <a:t>The rapid growth of e-marketplaces like Amazon has led to an enormous amount of customer-generated data,</a:t>
-            </a:r>
-            <a:r>
-              <a:rPr lang="en-US" sz="1700">
-                <a:latin typeface="Cambria"/>
-                <a:ea typeface="MS Mincho"/>
-                <a:cs typeface="Times New Roman"/>
-              </a:rPr>
-              <a:t> </a:t>
-            </a:r>
-            <a:r>
-              <a:rPr lang="en-US" sz="1700">
-                <a:effectLst/>
-                <a:latin typeface="Cambria"/>
-                <a:ea typeface="MS Mincho"/>
-                <a:cs typeface="Times New Roman"/>
-              </a:rPr>
-              <a:t>such as product reviews, ratings, and feedback. </a:t>
-            </a:r>
-            <a:endParaRPr lang="en-US"/>
-          </a:p>
-          <a:p>
-            <a:pPr>
-              <a:lnSpc>
-                <a:spcPct val="100000"/>
-              </a:lnSpc>
-            </a:pPr>
-            <a:r>
-              <a:rPr lang="en-US" sz="1700">
-                <a:effectLst/>
-                <a:latin typeface="Cambria"/>
-                <a:ea typeface="MS Mincho"/>
-                <a:cs typeface="Times New Roman"/>
-              </a:rPr>
-              <a:t>This data contains important information regarding customer feedback, that can directly affect business decisions like product improvements, marketing campaigns, and customer reach programs.</a:t>
-            </a:r>
-            <a:endParaRPr lang="en-US">
-              <a:latin typeface="Calisto MT"/>
-              <a:ea typeface="MS Mincho"/>
-              <a:cs typeface="Times New Roman"/>
-            </a:endParaRPr>
-          </a:p>
-          <a:p>
-            <a:pPr>
-              <a:lnSpc>
-                <a:spcPct val="100000"/>
-              </a:lnSpc>
-            </a:pPr>
-            <a:r>
-              <a:rPr lang="en-US" sz="1700">
-                <a:effectLst/>
-                <a:latin typeface="Cambria"/>
-                <a:ea typeface="MS Mincho"/>
-                <a:cs typeface="Times New Roman"/>
-              </a:rPr>
-              <a:t>For food business firms, understanding customer sentiment regarding their products is critical to product quality, improvement and customer satisfaction.</a:t>
-            </a:r>
-            <a:endParaRPr lang="en-US"/>
-          </a:p>
-          <a:p>
-            <a:pPr>
-              <a:lnSpc>
-                <a:spcPct val="100000"/>
-              </a:lnSpc>
-            </a:pPr>
-            <a:endParaRPr lang="en-US" sz="1700"/>
-          </a:p>
-        </p:txBody>
-      </p:sp>
-      <p:pic>
-        <p:nvPicPr>
-          <p:cNvPr id="5" name="Picture 4" descr="Fruits and vegetables in bags">
-            <a:extLst>
-              <a:ext uri="{FF2B5EF4-FFF2-40B4-BE49-F238E27FC236}">
-                <a16:creationId xmlns:a16="http://schemas.microsoft.com/office/drawing/2014/main" id="{A3CC0A9C-35BB-821A-9805-BB6D8E2237CF}"/>
-              </a:ext>
-            </a:extLst>
-          </p:cNvPr>
-          <p:cNvPicPr>
-            <a:picLocks noChangeAspect="1"/>
-          </p:cNvPicPr>
-          <p:nvPr/>
-        </p:nvPicPr>
-        <p:blipFill>
-          <a:blip r:embed="rId2"/>
-          <a:srcRect l="35851" r="7976" b="-2"/>
-          <a:stretch/>
-        </p:blipFill>
-        <p:spPr>
-          <a:xfrm>
-            <a:off x="6420752" y="-1"/>
-            <a:ext cx="5771248" cy="6857999"/>
-          </a:xfrm>
-          <a:prstGeom prst="rect">
+          <a:prstGeom prst="line">
             <a:avLst/>
           </a:prstGeom>
+          <a:ln w="12700">
+            <a:solidFill>
+              <a:schemeClr val="tx1"/>
+            </a:solidFill>
+          </a:ln>
         </p:spPr>
-      </p:pic>
+        <p:style>
+          <a:lnRef idx="1">
+            <a:schemeClr val="accent1"/>
+          </a:lnRef>
+          <a:fillRef idx="0">
+            <a:schemeClr val="accent1"/>
+          </a:fillRef>
+          <a:effectRef idx="0">
+            <a:schemeClr val="accent1"/>
+          </a:effectRef>
+          <a:fontRef idx="minor">
+            <a:schemeClr val="tx1"/>
+          </a:fontRef>
+        </p:style>
+      </p:cxnSp>
+      <p:graphicFrame>
+        <p:nvGraphicFramePr>
+          <p:cNvPr id="6" name="Content Placeholder 2">
+            <a:extLst>
+              <a:ext uri="{FF2B5EF4-FFF2-40B4-BE49-F238E27FC236}">
+                <a16:creationId xmlns:a16="http://schemas.microsoft.com/office/drawing/2014/main" id="{372CC5D4-A8EE-12D0-0718-083495ACAF38}"/>
+              </a:ext>
+            </a:extLst>
+          </p:cNvPr>
+          <p:cNvGraphicFramePr>
+            <a:graphicFrameLocks noGrp="1"/>
+          </p:cNvGraphicFramePr>
+          <p:nvPr>
+            <p:ph idx="1"/>
+            <p:extLst>
+              <p:ext uri="{D42A27DB-BD31-4B8C-83A1-F6EECF244321}">
+                <p14:modId xmlns:p14="http://schemas.microsoft.com/office/powerpoint/2010/main" val="1990463114"/>
+              </p:ext>
+            </p:extLst>
+          </p:nvPr>
+        </p:nvGraphicFramePr>
+        <p:xfrm>
+          <a:off x="700088" y="2222500"/>
+          <a:ext cx="10691812" cy="3740150"/>
+        </p:xfrm>
+        <a:graphic>
+          <a:graphicData uri="http://schemas.openxmlformats.org/drawingml/2006/diagram">
+            <dgm:relIds xmlns:dgm="http://schemas.openxmlformats.org/drawingml/2006/diagram" xmlns:r="http://schemas.openxmlformats.org/officeDocument/2006/relationships" r:dm="rId2" r:lo="rId3" r:qs="rId4" r:cs="rId5"/>
+          </a:graphicData>
+        </a:graphic>
+      </p:graphicFrame>
     </p:spTree>
     <p:extLst>
       <p:ext uri="{BB962C8B-B14F-4D97-AF65-F5344CB8AC3E}">
-        <p14:creationId xmlns:p14="http://schemas.microsoft.com/office/powerpoint/2010/main" val="2003370814"/>
+        <p14:creationId xmlns:p14="http://schemas.microsoft.com/office/powerpoint/2010/main" val="3243244310"/>
       </p:ext>
     </p:extLst>
   </p:cSld>
@@ -10553,7 +11221,7 @@
 </p:sld>
 </file>
 
-<file path=ppt/slides/slide20.xml><?xml version="1.0" encoding="utf-8"?>
+<file path=ppt/slides/slide22.xml><?xml version="1.0" encoding="utf-8"?>
 <p:sld xmlns:a="http://schemas.openxmlformats.org/drawingml/2006/main" xmlns:r="http://schemas.openxmlformats.org/officeDocument/2006/relationships" xmlns:p="http://schemas.openxmlformats.org/presentationml/2006/main">
   <p:cSld>
     <p:bg>

</xml_diff>